<commit_message>
Improve powerpoint by adding first results
</commit_message>
<xml_diff>
--- a/Perf Eval - Premiere presentation.pptx
+++ b/Perf Eval - Premiere presentation.pptx
@@ -4,10 +4,18 @@
   <p:sldMasterIdLst>
     <p:sldMasterId id="2147483648" r:id="rId1"/>
   </p:sldMasterIdLst>
+  <p:notesMasterIdLst>
+    <p:notesMasterId r:id="rId10"/>
+  </p:notesMasterIdLst>
   <p:sldIdLst>
     <p:sldId id="256" r:id="rId2"/>
     <p:sldId id="257" r:id="rId3"/>
-    <p:sldId id="258" r:id="rId4"/>
+    <p:sldId id="262" r:id="rId4"/>
+    <p:sldId id="259" r:id="rId5"/>
+    <p:sldId id="260" r:id="rId6"/>
+    <p:sldId id="261" r:id="rId7"/>
+    <p:sldId id="263" r:id="rId8"/>
+    <p:sldId id="264" r:id="rId9"/>
   </p:sldIdLst>
   <p:sldSz cx="12192000" cy="6858000"/>
   <p:notesSz cx="6858000" cy="9144000"/>
@@ -112,6 +120,356 @@
     </p:ext>
   </p:extLst>
 </p:presentation>
+</file>
+
+<file path=ppt/notesMasters/notesMaster1.xml><?xml version="1.0" encoding="utf-8"?>
+<p:notesMaster xmlns:a="http://schemas.openxmlformats.org/drawingml/2006/main" xmlns:r="http://schemas.openxmlformats.org/officeDocument/2006/relationships" xmlns:p="http://schemas.openxmlformats.org/presentationml/2006/main">
+  <p:cSld>
+    <p:bg>
+      <p:bgRef idx="1001">
+        <a:schemeClr val="bg1"/>
+      </p:bgRef>
+    </p:bg>
+    <p:spTree>
+      <p:nvGrpSpPr>
+        <p:cNvPr id="1" name=""/>
+        <p:cNvGrpSpPr/>
+        <p:nvPr/>
+      </p:nvGrpSpPr>
+      <p:grpSpPr>
+        <a:xfrm>
+          <a:off x="0" y="0"/>
+          <a:ext cx="0" cy="0"/>
+          <a:chOff x="0" y="0"/>
+          <a:chExt cx="0" cy="0"/>
+        </a:xfrm>
+      </p:grpSpPr>
+      <p:sp>
+        <p:nvSpPr>
+          <p:cNvPr id="2" name="Espace réservé de l'en-tête 1"/>
+          <p:cNvSpPr>
+            <a:spLocks noGrp="1"/>
+          </p:cNvSpPr>
+          <p:nvPr>
+            <p:ph type="hdr" sz="quarter"/>
+          </p:nvPr>
+        </p:nvSpPr>
+        <p:spPr>
+          <a:xfrm>
+            <a:off x="0" y="0"/>
+            <a:ext cx="2971800" cy="458788"/>
+          </a:xfrm>
+          <a:prstGeom prst="rect">
+            <a:avLst/>
+          </a:prstGeom>
+        </p:spPr>
+        <p:txBody>
+          <a:bodyPr vert="horz" lIns="91440" tIns="45720" rIns="91440" bIns="45720" rtlCol="0"/>
+          <a:lstStyle>
+            <a:lvl1pPr algn="l">
+              <a:defRPr sz="1200"/>
+            </a:lvl1pPr>
+          </a:lstStyle>
+          <a:p>
+            <a:endParaRPr lang="fr-CH"/>
+          </a:p>
+        </p:txBody>
+      </p:sp>
+      <p:sp>
+        <p:nvSpPr>
+          <p:cNvPr id="3" name="Espace réservé de la date 2"/>
+          <p:cNvSpPr>
+            <a:spLocks noGrp="1"/>
+          </p:cNvSpPr>
+          <p:nvPr>
+            <p:ph type="dt" idx="1"/>
+          </p:nvPr>
+        </p:nvSpPr>
+        <p:spPr>
+          <a:xfrm>
+            <a:off x="3884613" y="0"/>
+            <a:ext cx="2971800" cy="458788"/>
+          </a:xfrm>
+          <a:prstGeom prst="rect">
+            <a:avLst/>
+          </a:prstGeom>
+        </p:spPr>
+        <p:txBody>
+          <a:bodyPr vert="horz" lIns="91440" tIns="45720" rIns="91440" bIns="45720" rtlCol="0"/>
+          <a:lstStyle>
+            <a:lvl1pPr algn="r">
+              <a:defRPr sz="1200"/>
+            </a:lvl1pPr>
+          </a:lstStyle>
+          <a:p>
+            <a:fld id="{57BD9E6B-C072-4D7A-B59A-50AC8BFD878C}" type="datetimeFigureOut">
+              <a:rPr lang="fr-CH" smtClean="0"/>
+              <a:t>29.04.2015</a:t>
+            </a:fld>
+            <a:endParaRPr lang="fr-CH"/>
+          </a:p>
+        </p:txBody>
+      </p:sp>
+      <p:sp>
+        <p:nvSpPr>
+          <p:cNvPr id="4" name="Espace réservé de l'image des diapositives 3"/>
+          <p:cNvSpPr>
+            <a:spLocks noGrp="1" noRot="1" noChangeAspect="1"/>
+          </p:cNvSpPr>
+          <p:nvPr>
+            <p:ph type="sldImg" idx="2"/>
+          </p:nvPr>
+        </p:nvSpPr>
+        <p:spPr>
+          <a:xfrm>
+            <a:off x="685800" y="1143000"/>
+            <a:ext cx="5486400" cy="3086100"/>
+          </a:xfrm>
+          <a:prstGeom prst="rect">
+            <a:avLst/>
+          </a:prstGeom>
+          <a:noFill/>
+          <a:ln w="12700">
+            <a:solidFill>
+              <a:prstClr val="black"/>
+            </a:solidFill>
+          </a:ln>
+        </p:spPr>
+        <p:txBody>
+          <a:bodyPr vert="horz" lIns="91440" tIns="45720" rIns="91440" bIns="45720" rtlCol="0" anchor="ctr"/>
+          <a:lstStyle/>
+          <a:p>
+            <a:endParaRPr lang="fr-CH"/>
+          </a:p>
+        </p:txBody>
+      </p:sp>
+      <p:sp>
+        <p:nvSpPr>
+          <p:cNvPr id="5" name="Espace réservé des commentaires 4"/>
+          <p:cNvSpPr>
+            <a:spLocks noGrp="1"/>
+          </p:cNvSpPr>
+          <p:nvPr>
+            <p:ph type="body" sz="quarter" idx="3"/>
+          </p:nvPr>
+        </p:nvSpPr>
+        <p:spPr>
+          <a:xfrm>
+            <a:off x="685800" y="4400550"/>
+            <a:ext cx="5486400" cy="3600450"/>
+          </a:xfrm>
+          <a:prstGeom prst="rect">
+            <a:avLst/>
+          </a:prstGeom>
+        </p:spPr>
+        <p:txBody>
+          <a:bodyPr vert="horz" lIns="91440" tIns="45720" rIns="91440" bIns="45720" rtlCol="0"/>
+          <a:lstStyle/>
+          <a:p>
+            <a:pPr lvl="0"/>
+            <a:r>
+              <a:rPr lang="fr-FR" smtClean="0"/>
+              <a:t>Modifiez les styles du texte du masque</a:t>
+            </a:r>
+          </a:p>
+          <a:p>
+            <a:pPr lvl="1"/>
+            <a:r>
+              <a:rPr lang="fr-FR" smtClean="0"/>
+              <a:t>Deuxième niveau</a:t>
+            </a:r>
+          </a:p>
+          <a:p>
+            <a:pPr lvl="2"/>
+            <a:r>
+              <a:rPr lang="fr-FR" smtClean="0"/>
+              <a:t>Troisième niveau</a:t>
+            </a:r>
+          </a:p>
+          <a:p>
+            <a:pPr lvl="3"/>
+            <a:r>
+              <a:rPr lang="fr-FR" smtClean="0"/>
+              <a:t>Quatrième niveau</a:t>
+            </a:r>
+          </a:p>
+          <a:p>
+            <a:pPr lvl="4"/>
+            <a:r>
+              <a:rPr lang="fr-FR" smtClean="0"/>
+              <a:t>Cinquième niveau</a:t>
+            </a:r>
+            <a:endParaRPr lang="fr-CH"/>
+          </a:p>
+        </p:txBody>
+      </p:sp>
+      <p:sp>
+        <p:nvSpPr>
+          <p:cNvPr id="6" name="Espace réservé du pied de page 5"/>
+          <p:cNvSpPr>
+            <a:spLocks noGrp="1"/>
+          </p:cNvSpPr>
+          <p:nvPr>
+            <p:ph type="ftr" sz="quarter" idx="4"/>
+          </p:nvPr>
+        </p:nvSpPr>
+        <p:spPr>
+          <a:xfrm>
+            <a:off x="0" y="8685213"/>
+            <a:ext cx="2971800" cy="458787"/>
+          </a:xfrm>
+          <a:prstGeom prst="rect">
+            <a:avLst/>
+          </a:prstGeom>
+        </p:spPr>
+        <p:txBody>
+          <a:bodyPr vert="horz" lIns="91440" tIns="45720" rIns="91440" bIns="45720" rtlCol="0" anchor="b"/>
+          <a:lstStyle>
+            <a:lvl1pPr algn="l">
+              <a:defRPr sz="1200"/>
+            </a:lvl1pPr>
+          </a:lstStyle>
+          <a:p>
+            <a:endParaRPr lang="fr-CH"/>
+          </a:p>
+        </p:txBody>
+      </p:sp>
+      <p:sp>
+        <p:nvSpPr>
+          <p:cNvPr id="7" name="Espace réservé du numéro de diapositive 6"/>
+          <p:cNvSpPr>
+            <a:spLocks noGrp="1"/>
+          </p:cNvSpPr>
+          <p:nvPr>
+            <p:ph type="sldNum" sz="quarter" idx="5"/>
+          </p:nvPr>
+        </p:nvSpPr>
+        <p:spPr>
+          <a:xfrm>
+            <a:off x="3884613" y="8685213"/>
+            <a:ext cx="2971800" cy="458787"/>
+          </a:xfrm>
+          <a:prstGeom prst="rect">
+            <a:avLst/>
+          </a:prstGeom>
+        </p:spPr>
+        <p:txBody>
+          <a:bodyPr vert="horz" lIns="91440" tIns="45720" rIns="91440" bIns="45720" rtlCol="0" anchor="b"/>
+          <a:lstStyle>
+            <a:lvl1pPr algn="r">
+              <a:defRPr sz="1200"/>
+            </a:lvl1pPr>
+          </a:lstStyle>
+          <a:p>
+            <a:fld id="{F80B93E3-93CD-4E6E-941D-12FC85ED9A2F}" type="slidenum">
+              <a:rPr lang="fr-CH" smtClean="0"/>
+              <a:t>‹N°›</a:t>
+            </a:fld>
+            <a:endParaRPr lang="fr-CH"/>
+          </a:p>
+        </p:txBody>
+      </p:sp>
+    </p:spTree>
+    <p:extLst>
+      <p:ext uri="{BB962C8B-B14F-4D97-AF65-F5344CB8AC3E}">
+        <p14:creationId xmlns:p14="http://schemas.microsoft.com/office/powerpoint/2010/main" val="708676576"/>
+      </p:ext>
+    </p:extLst>
+  </p:cSld>
+  <p:clrMap bg1="lt1" tx1="dk1" bg2="lt2" tx2="dk2" accent1="accent1" accent2="accent2" accent3="accent3" accent4="accent4" accent5="accent5" accent6="accent6" hlink="hlink" folHlink="folHlink"/>
+  <p:notesStyle>
+    <a:lvl1pPr marL="0" algn="l" defTabSz="914400" rtl="0" eaLnBrk="1" latinLnBrk="0" hangingPunct="1">
+      <a:defRPr sz="1200" kern="1200">
+        <a:solidFill>
+          <a:schemeClr val="tx1"/>
+        </a:solidFill>
+        <a:latin typeface="+mn-lt"/>
+        <a:ea typeface="+mn-ea"/>
+        <a:cs typeface="+mn-cs"/>
+      </a:defRPr>
+    </a:lvl1pPr>
+    <a:lvl2pPr marL="457200" algn="l" defTabSz="914400" rtl="0" eaLnBrk="1" latinLnBrk="0" hangingPunct="1">
+      <a:defRPr sz="1200" kern="1200">
+        <a:solidFill>
+          <a:schemeClr val="tx1"/>
+        </a:solidFill>
+        <a:latin typeface="+mn-lt"/>
+        <a:ea typeface="+mn-ea"/>
+        <a:cs typeface="+mn-cs"/>
+      </a:defRPr>
+    </a:lvl2pPr>
+    <a:lvl3pPr marL="914400" algn="l" defTabSz="914400" rtl="0" eaLnBrk="1" latinLnBrk="0" hangingPunct="1">
+      <a:defRPr sz="1200" kern="1200">
+        <a:solidFill>
+          <a:schemeClr val="tx1"/>
+        </a:solidFill>
+        <a:latin typeface="+mn-lt"/>
+        <a:ea typeface="+mn-ea"/>
+        <a:cs typeface="+mn-cs"/>
+      </a:defRPr>
+    </a:lvl3pPr>
+    <a:lvl4pPr marL="1371600" algn="l" defTabSz="914400" rtl="0" eaLnBrk="1" latinLnBrk="0" hangingPunct="1">
+      <a:defRPr sz="1200" kern="1200">
+        <a:solidFill>
+          <a:schemeClr val="tx1"/>
+        </a:solidFill>
+        <a:latin typeface="+mn-lt"/>
+        <a:ea typeface="+mn-ea"/>
+        <a:cs typeface="+mn-cs"/>
+      </a:defRPr>
+    </a:lvl4pPr>
+    <a:lvl5pPr marL="1828800" algn="l" defTabSz="914400" rtl="0" eaLnBrk="1" latinLnBrk="0" hangingPunct="1">
+      <a:defRPr sz="1200" kern="1200">
+        <a:solidFill>
+          <a:schemeClr val="tx1"/>
+        </a:solidFill>
+        <a:latin typeface="+mn-lt"/>
+        <a:ea typeface="+mn-ea"/>
+        <a:cs typeface="+mn-cs"/>
+      </a:defRPr>
+    </a:lvl5pPr>
+    <a:lvl6pPr marL="2286000" algn="l" defTabSz="914400" rtl="0" eaLnBrk="1" latinLnBrk="0" hangingPunct="1">
+      <a:defRPr sz="1200" kern="1200">
+        <a:solidFill>
+          <a:schemeClr val="tx1"/>
+        </a:solidFill>
+        <a:latin typeface="+mn-lt"/>
+        <a:ea typeface="+mn-ea"/>
+        <a:cs typeface="+mn-cs"/>
+      </a:defRPr>
+    </a:lvl6pPr>
+    <a:lvl7pPr marL="2743200" algn="l" defTabSz="914400" rtl="0" eaLnBrk="1" latinLnBrk="0" hangingPunct="1">
+      <a:defRPr sz="1200" kern="1200">
+        <a:solidFill>
+          <a:schemeClr val="tx1"/>
+        </a:solidFill>
+        <a:latin typeface="+mn-lt"/>
+        <a:ea typeface="+mn-ea"/>
+        <a:cs typeface="+mn-cs"/>
+      </a:defRPr>
+    </a:lvl7pPr>
+    <a:lvl8pPr marL="3200400" algn="l" defTabSz="914400" rtl="0" eaLnBrk="1" latinLnBrk="0" hangingPunct="1">
+      <a:defRPr sz="1200" kern="1200">
+        <a:solidFill>
+          <a:schemeClr val="tx1"/>
+        </a:solidFill>
+        <a:latin typeface="+mn-lt"/>
+        <a:ea typeface="+mn-ea"/>
+        <a:cs typeface="+mn-cs"/>
+      </a:defRPr>
+    </a:lvl8pPr>
+    <a:lvl9pPr marL="3657600" algn="l" defTabSz="914400" rtl="0" eaLnBrk="1" latinLnBrk="0" hangingPunct="1">
+      <a:defRPr sz="1200" kern="1200">
+        <a:solidFill>
+          <a:schemeClr val="tx1"/>
+        </a:solidFill>
+        <a:latin typeface="+mn-lt"/>
+        <a:ea typeface="+mn-ea"/>
+        <a:cs typeface="+mn-cs"/>
+      </a:defRPr>
+    </a:lvl9pPr>
+  </p:notesStyle>
+</p:notesMaster>
 </file>
 
 <file path=ppt/slideLayouts/slideLayout1.xml><?xml version="1.0" encoding="utf-8"?>
@@ -2996,9 +3354,9 @@
       </p:grpSpPr>
       <p:sp>
         <p:nvSpPr>
-          <p:cNvPr id="2" name="Titre 1"/>
-          <p:cNvSpPr>
-            <a:spLocks noGrp="1"/>
+          <p:cNvPr id="7" name="Rectangle 2"/>
+          <p:cNvSpPr>
+            <a:spLocks noGrp="1" noChangeArrowheads="1"/>
           </p:cNvSpPr>
           <p:nvPr>
             <p:ph type="ctrTitle"/>
@@ -3006,8 +3364,8 @@
         </p:nvSpPr>
         <p:spPr>
           <a:xfrm>
-            <a:off x="1652016" y="70803"/>
-            <a:ext cx="9144000" cy="2387600"/>
+            <a:off x="0" y="420497"/>
+            <a:ext cx="12192000" cy="1470025"/>
           </a:xfrm>
         </p:spPr>
         <p:txBody>
@@ -3016,42 +3374,51 @@
           </a:bodyPr>
           <a:lstStyle/>
           <a:p>
-            <a:r>
-              <a:rPr lang="fr-CH" altLang="en-US" dirty="0" err="1" smtClean="0"/>
-              <a:t>What</a:t>
-            </a:r>
-            <a:r>
-              <a:rPr lang="fr-CH" altLang="en-US" dirty="0" smtClean="0"/>
-              <a:t> </a:t>
-            </a:r>
-            <a:r>
-              <a:rPr lang="fr-CH" altLang="en-US" dirty="0" err="1" smtClean="0"/>
-              <a:t>is</a:t>
-            </a:r>
-            <a:r>
-              <a:rPr lang="fr-CH" altLang="en-US" dirty="0" smtClean="0"/>
-              <a:t> </a:t>
-            </a:r>
-            <a:r>
-              <a:rPr lang="fr-CH" altLang="en-US" dirty="0" err="1" smtClean="0"/>
-              <a:t>your</a:t>
-            </a:r>
-            <a:r>
-              <a:rPr lang="fr-CH" altLang="en-US" dirty="0" smtClean="0"/>
-              <a:t> goal ?</a:t>
+            <a:pPr fontAlgn="base">
+              <a:spcAft>
+                <a:spcPct val="0"/>
+              </a:spcAft>
+            </a:pPr>
+            <a:r>
+              <a:rPr lang="en-US" altLang="en-US" sz="3600" b="1" dirty="0" smtClean="0">
+                <a:solidFill>
+                  <a:srgbClr val="0099CC"/>
+                </a:solidFill>
+                <a:latin typeface="+mn-lt"/>
+              </a:rPr>
+              <a:t>Performance analysis of</a:t>
             </a:r>
             <a:br>
-              <a:rPr lang="fr-CH" altLang="en-US" dirty="0" smtClean="0"/>
+              <a:rPr lang="en-US" altLang="en-US" sz="3600" b="1" dirty="0" smtClean="0">
+                <a:solidFill>
+                  <a:srgbClr val="0099CC"/>
+                </a:solidFill>
+                <a:latin typeface="+mn-lt"/>
+              </a:rPr>
             </a:br>
-            <a:endParaRPr lang="fr-CH" dirty="0"/>
-          </a:p>
-        </p:txBody>
-      </p:sp>
-      <p:sp>
-        <p:nvSpPr>
-          <p:cNvPr id="3" name="Sous-titre 2"/>
-          <p:cNvSpPr>
-            <a:spLocks noGrp="1"/>
+            <a:r>
+              <a:rPr lang="en-US" altLang="en-US" sz="3600" b="1" dirty="0" smtClean="0">
+                <a:solidFill>
+                  <a:srgbClr val="0099CC"/>
+                </a:solidFill>
+                <a:latin typeface="+mn-lt"/>
+              </a:rPr>
+              <a:t>multi-threading in In-Memory Data-Stores</a:t>
+            </a:r>
+            <a:endParaRPr lang="en-US" altLang="en-US" sz="3600" b="1" dirty="0">
+              <a:solidFill>
+                <a:srgbClr val="0099CC"/>
+              </a:solidFill>
+              <a:latin typeface="+mn-lt"/>
+            </a:endParaRPr>
+          </a:p>
+        </p:txBody>
+      </p:sp>
+      <p:sp>
+        <p:nvSpPr>
+          <p:cNvPr id="8" name="Rectangle 3"/>
+          <p:cNvSpPr>
+            <a:spLocks noGrp="1" noChangeArrowheads="1"/>
           </p:cNvSpPr>
           <p:nvPr>
             <p:ph type="subTitle" idx="1"/>
@@ -3059,64 +3426,134 @@
         </p:nvSpPr>
         <p:spPr>
           <a:xfrm>
-            <a:off x="728472" y="2248726"/>
-            <a:ext cx="9144000" cy="3987482"/>
+            <a:off x="0" y="2395728"/>
+            <a:ext cx="12192000" cy="3502152"/>
           </a:xfrm>
         </p:spPr>
         <p:txBody>
-          <a:bodyPr/>
+          <a:bodyPr>
+            <a:noAutofit/>
+          </a:bodyPr>
           <a:lstStyle/>
           <a:p>
-            <a:pPr marL="342900" indent="-342900" algn="l">
-              <a:buFont typeface="Arial" panose="020B0604020202020204" pitchFamily="34" charset="0"/>
-              <a:buChar char="•"/>
+            <a:pPr fontAlgn="base">
+              <a:lnSpc>
+                <a:spcPct val="170000"/>
+              </a:lnSpc>
+              <a:spcBef>
+                <a:spcPct val="20000"/>
+              </a:spcBef>
+              <a:spcAft>
+                <a:spcPct val="0"/>
+              </a:spcAft>
             </a:pPr>
             <a:r>
-              <a:rPr lang="en-US" dirty="0"/>
-              <a:t>evaluate the </a:t>
-            </a:r>
-            <a:r>
-              <a:rPr lang="en-US" dirty="0" smtClean="0"/>
-              <a:t>performance of </a:t>
-            </a:r>
-            <a:r>
-              <a:rPr lang="en-US" dirty="0"/>
-              <a:t>all the architectures that we </a:t>
-            </a:r>
-            <a:r>
-              <a:rPr lang="en-US" dirty="0" smtClean="0"/>
-              <a:t>built</a:t>
-            </a:r>
-          </a:p>
-          <a:p>
-            <a:pPr marL="800100" lvl="1" indent="-342900" algn="l">
-              <a:buFont typeface="Arial" panose="020B0604020202020204" pitchFamily="34" charset="0"/>
-              <a:buChar char="•"/>
+              <a:rPr lang="fr-FR" altLang="en-US" sz="1700" dirty="0" smtClean="0">
+                <a:solidFill>
+                  <a:srgbClr val="5F5F5F"/>
+                </a:solidFill>
+              </a:rPr>
+              <a:t>Grégory Ludovic Maitre</a:t>
+            </a:r>
+          </a:p>
+          <a:p>
+            <a:pPr fontAlgn="base">
+              <a:lnSpc>
+                <a:spcPct val="170000"/>
+              </a:lnSpc>
+              <a:spcBef>
+                <a:spcPct val="20000"/>
+              </a:spcBef>
+              <a:spcAft>
+                <a:spcPct val="0"/>
+              </a:spcAft>
             </a:pPr>
             <a:r>
-              <a:rPr lang="en-US" dirty="0" smtClean="0"/>
-              <a:t>comparing the performances between our different architectures</a:t>
-            </a:r>
-          </a:p>
-          <a:p>
-            <a:pPr marL="800100" lvl="1" indent="-342900" algn="l">
-              <a:buFont typeface="Arial" panose="020B0604020202020204" pitchFamily="34" charset="0"/>
-              <a:buChar char="•"/>
+              <a:rPr lang="fr-FR" altLang="en-US" sz="1700" dirty="0" smtClean="0">
+                <a:solidFill>
+                  <a:srgbClr val="5F5F5F"/>
+                </a:solidFill>
+              </a:rPr>
+              <a:t>Patrick Daniel Oliveira Andrade</a:t>
+            </a:r>
+          </a:p>
+          <a:p>
+            <a:pPr fontAlgn="base">
+              <a:lnSpc>
+                <a:spcPct val="170000"/>
+              </a:lnSpc>
+              <a:spcBef>
+                <a:spcPct val="20000"/>
+              </a:spcBef>
+              <a:spcAft>
+                <a:spcPct val="0"/>
+              </a:spcAft>
             </a:pPr>
-            <a:r>
-              <a:rPr lang="en-US" smtClean="0"/>
-              <a:t>under different load of clients</a:t>
-            </a:r>
-          </a:p>
-          <a:p>
-            <a:pPr marL="800100" lvl="1" indent="-342900" algn="l">
-              <a:buFont typeface="Arial" panose="020B0604020202020204" pitchFamily="34" charset="0"/>
-              <a:buChar char="•"/>
+            <a:endParaRPr lang="fr-FR" altLang="en-US" sz="1700" dirty="0">
+              <a:solidFill>
+                <a:srgbClr val="5F5F5F"/>
+              </a:solidFill>
+            </a:endParaRPr>
+          </a:p>
+          <a:p>
+            <a:pPr fontAlgn="base">
+              <a:lnSpc>
+                <a:spcPct val="170000"/>
+              </a:lnSpc>
+              <a:spcBef>
+                <a:spcPct val="20000"/>
+              </a:spcBef>
+              <a:spcAft>
+                <a:spcPct val="0"/>
+              </a:spcAft>
             </a:pPr>
-            <a:endParaRPr lang="en-US" dirty="0" smtClean="0"/>
-          </a:p>
-          <a:p>
-            <a:endParaRPr lang="fr-CH" dirty="0"/>
+            <a:endParaRPr lang="fr-FR" altLang="en-US" sz="1700" dirty="0" smtClean="0">
+              <a:solidFill>
+                <a:srgbClr val="5F5F5F"/>
+              </a:solidFill>
+            </a:endParaRPr>
+          </a:p>
+          <a:p>
+            <a:pPr fontAlgn="base">
+              <a:lnSpc>
+                <a:spcPct val="170000"/>
+              </a:lnSpc>
+              <a:spcBef>
+                <a:spcPct val="20000"/>
+              </a:spcBef>
+              <a:spcAft>
+                <a:spcPct val="0"/>
+              </a:spcAft>
+            </a:pPr>
+            <a:r>
+              <a:rPr lang="fr-FR" altLang="en-US" sz="1700" dirty="0" smtClean="0">
+                <a:solidFill>
+                  <a:srgbClr val="5F5F5F"/>
+                </a:solidFill>
+              </a:rPr>
+              <a:t>1</a:t>
+            </a:r>
+            <a:r>
+              <a:rPr lang="fr-FR" altLang="en-US" sz="1700" baseline="30000" dirty="0" smtClean="0">
+                <a:solidFill>
+                  <a:srgbClr val="5F5F5F"/>
+                </a:solidFill>
+              </a:rPr>
+              <a:t>st</a:t>
+            </a:r>
+            <a:r>
+              <a:rPr lang="fr-FR" altLang="en-US" sz="1700" dirty="0" smtClean="0">
+                <a:solidFill>
+                  <a:srgbClr val="5F5F5F"/>
+                </a:solidFill>
+              </a:rPr>
+              <a:t> May 2015</a:t>
+            </a:r>
+            <a:endParaRPr lang="fr-FR" altLang="en-US" sz="1700" dirty="0">
+              <a:solidFill>
+                <a:srgbClr val="5F5F5F"/>
+              </a:solidFill>
+            </a:endParaRPr>
           </a:p>
         </p:txBody>
       </p:sp>
@@ -3130,6 +3567,13 @@
   <p:clrMapOvr>
     <a:masterClrMapping/>
   </p:clrMapOvr>
+  <p:timing>
+    <p:tnLst>
+      <p:par>
+        <p:cTn id="1" dur="indefinite" restart="never" nodeType="tmRoot"/>
+      </p:par>
+    </p:tnLst>
+  </p:timing>
 </p:sld>
 </file>
 
@@ -3150,6 +3594,386 @@
           <a:chExt cx="0" cy="0"/>
         </a:xfrm>
       </p:grpSpPr>
+      <p:sp>
+        <p:nvSpPr>
+          <p:cNvPr id="2" name="Titre 1"/>
+          <p:cNvSpPr txBox="1">
+            <a:spLocks/>
+          </p:cNvSpPr>
+          <p:nvPr/>
+        </p:nvSpPr>
+        <p:spPr>
+          <a:xfrm>
+            <a:off x="0" y="409131"/>
+            <a:ext cx="12192000" cy="605853"/>
+          </a:xfrm>
+          <a:prstGeom prst="rect">
+            <a:avLst/>
+          </a:prstGeom>
+        </p:spPr>
+        <p:txBody>
+          <a:bodyPr vert="horz" lIns="91440" tIns="45720" rIns="91440" bIns="45720" rtlCol="0" anchor="ctr">
+            <a:noAutofit/>
+          </a:bodyPr>
+          <a:lstStyle>
+            <a:lvl1pPr algn="l" defTabSz="914400" rtl="0" eaLnBrk="1" latinLnBrk="0" hangingPunct="1">
+              <a:lnSpc>
+                <a:spcPct val="90000"/>
+              </a:lnSpc>
+              <a:spcBef>
+                <a:spcPct val="0"/>
+              </a:spcBef>
+              <a:buNone/>
+              <a:defRPr sz="4400" kern="1200">
+                <a:solidFill>
+                  <a:schemeClr val="tx1"/>
+                </a:solidFill>
+                <a:latin typeface="+mj-lt"/>
+                <a:ea typeface="+mj-ea"/>
+                <a:cs typeface="+mj-cs"/>
+              </a:defRPr>
+            </a:lvl1pPr>
+          </a:lstStyle>
+          <a:p>
+            <a:pPr algn="ctr" eaLnBrk="0" fontAlgn="base" hangingPunct="0">
+              <a:spcAft>
+                <a:spcPct val="0"/>
+              </a:spcAft>
+            </a:pPr>
+            <a:r>
+              <a:rPr lang="fr-CH" altLang="en-US" sz="3600" b="1" dirty="0" err="1" smtClean="0">
+                <a:solidFill>
+                  <a:srgbClr val="0099CC"/>
+                </a:solidFill>
+                <a:latin typeface="+mn-lt"/>
+              </a:rPr>
+              <a:t>Outline</a:t>
+            </a:r>
+            <a:endParaRPr lang="fr-CH" altLang="en-US" sz="3600" b="1" dirty="0" smtClean="0">
+              <a:solidFill>
+                <a:srgbClr val="0099CC"/>
+              </a:solidFill>
+              <a:latin typeface="+mn-lt"/>
+            </a:endParaRPr>
+          </a:p>
+        </p:txBody>
+      </p:sp>
+      <p:sp>
+        <p:nvSpPr>
+          <p:cNvPr id="3" name="Sous-titre 2"/>
+          <p:cNvSpPr txBox="1">
+            <a:spLocks/>
+          </p:cNvSpPr>
+          <p:nvPr/>
+        </p:nvSpPr>
+        <p:spPr>
+          <a:xfrm>
+            <a:off x="786384" y="2065846"/>
+            <a:ext cx="10661904" cy="2881058"/>
+          </a:xfrm>
+          <a:prstGeom prst="rect">
+            <a:avLst/>
+          </a:prstGeom>
+        </p:spPr>
+        <p:txBody>
+          <a:bodyPr vert="horz" lIns="91440" tIns="45720" rIns="91440" bIns="45720" rtlCol="0">
+            <a:noAutofit/>
+          </a:bodyPr>
+          <a:lstStyle>
+            <a:lvl1pPr marL="228600" indent="-228600" algn="l" defTabSz="914400" rtl="0" eaLnBrk="1" latinLnBrk="0" hangingPunct="1">
+              <a:lnSpc>
+                <a:spcPct val="90000"/>
+              </a:lnSpc>
+              <a:spcBef>
+                <a:spcPts val="1000"/>
+              </a:spcBef>
+              <a:buFont typeface="Arial" panose="020B0604020202020204" pitchFamily="34" charset="0"/>
+              <a:buChar char="•"/>
+              <a:defRPr sz="2800" kern="1200">
+                <a:solidFill>
+                  <a:schemeClr val="tx1"/>
+                </a:solidFill>
+                <a:latin typeface="+mn-lt"/>
+                <a:ea typeface="+mn-ea"/>
+                <a:cs typeface="+mn-cs"/>
+              </a:defRPr>
+            </a:lvl1pPr>
+            <a:lvl2pPr marL="685800" indent="-228600" algn="l" defTabSz="914400" rtl="0" eaLnBrk="1" latinLnBrk="0" hangingPunct="1">
+              <a:lnSpc>
+                <a:spcPct val="90000"/>
+              </a:lnSpc>
+              <a:spcBef>
+                <a:spcPts val="500"/>
+              </a:spcBef>
+              <a:buFont typeface="Arial" panose="020B0604020202020204" pitchFamily="34" charset="0"/>
+              <a:buChar char="•"/>
+              <a:defRPr sz="2400" kern="1200">
+                <a:solidFill>
+                  <a:schemeClr val="tx1"/>
+                </a:solidFill>
+                <a:latin typeface="+mn-lt"/>
+                <a:ea typeface="+mn-ea"/>
+                <a:cs typeface="+mn-cs"/>
+              </a:defRPr>
+            </a:lvl2pPr>
+            <a:lvl3pPr marL="1143000" indent="-228600" algn="l" defTabSz="914400" rtl="0" eaLnBrk="1" latinLnBrk="0" hangingPunct="1">
+              <a:lnSpc>
+                <a:spcPct val="90000"/>
+              </a:lnSpc>
+              <a:spcBef>
+                <a:spcPts val="500"/>
+              </a:spcBef>
+              <a:buFont typeface="Arial" panose="020B0604020202020204" pitchFamily="34" charset="0"/>
+              <a:buChar char="•"/>
+              <a:defRPr sz="2000" kern="1200">
+                <a:solidFill>
+                  <a:schemeClr val="tx1"/>
+                </a:solidFill>
+                <a:latin typeface="+mn-lt"/>
+                <a:ea typeface="+mn-ea"/>
+                <a:cs typeface="+mn-cs"/>
+              </a:defRPr>
+            </a:lvl3pPr>
+            <a:lvl4pPr marL="1600200" indent="-228600" algn="l" defTabSz="914400" rtl="0" eaLnBrk="1" latinLnBrk="0" hangingPunct="1">
+              <a:lnSpc>
+                <a:spcPct val="90000"/>
+              </a:lnSpc>
+              <a:spcBef>
+                <a:spcPts val="500"/>
+              </a:spcBef>
+              <a:buFont typeface="Arial" panose="020B0604020202020204" pitchFamily="34" charset="0"/>
+              <a:buChar char="•"/>
+              <a:defRPr sz="1800" kern="1200">
+                <a:solidFill>
+                  <a:schemeClr val="tx1"/>
+                </a:solidFill>
+                <a:latin typeface="+mn-lt"/>
+                <a:ea typeface="+mn-ea"/>
+                <a:cs typeface="+mn-cs"/>
+              </a:defRPr>
+            </a:lvl4pPr>
+            <a:lvl5pPr marL="2057400" indent="-228600" algn="l" defTabSz="914400" rtl="0" eaLnBrk="1" latinLnBrk="0" hangingPunct="1">
+              <a:lnSpc>
+                <a:spcPct val="90000"/>
+              </a:lnSpc>
+              <a:spcBef>
+                <a:spcPts val="500"/>
+              </a:spcBef>
+              <a:buFont typeface="Arial" panose="020B0604020202020204" pitchFamily="34" charset="0"/>
+              <a:buChar char="•"/>
+              <a:defRPr sz="1800" kern="1200">
+                <a:solidFill>
+                  <a:schemeClr val="tx1"/>
+                </a:solidFill>
+                <a:latin typeface="+mn-lt"/>
+                <a:ea typeface="+mn-ea"/>
+                <a:cs typeface="+mn-cs"/>
+              </a:defRPr>
+            </a:lvl5pPr>
+            <a:lvl6pPr marL="2514600" indent="-228600" algn="l" defTabSz="914400" rtl="0" eaLnBrk="1" latinLnBrk="0" hangingPunct="1">
+              <a:lnSpc>
+                <a:spcPct val="90000"/>
+              </a:lnSpc>
+              <a:spcBef>
+                <a:spcPts val="500"/>
+              </a:spcBef>
+              <a:buFont typeface="Arial" panose="020B0604020202020204" pitchFamily="34" charset="0"/>
+              <a:buChar char="•"/>
+              <a:defRPr sz="1800" kern="1200">
+                <a:solidFill>
+                  <a:schemeClr val="tx1"/>
+                </a:solidFill>
+                <a:latin typeface="+mn-lt"/>
+                <a:ea typeface="+mn-ea"/>
+                <a:cs typeface="+mn-cs"/>
+              </a:defRPr>
+            </a:lvl6pPr>
+            <a:lvl7pPr marL="2971800" indent="-228600" algn="l" defTabSz="914400" rtl="0" eaLnBrk="1" latinLnBrk="0" hangingPunct="1">
+              <a:lnSpc>
+                <a:spcPct val="90000"/>
+              </a:lnSpc>
+              <a:spcBef>
+                <a:spcPts val="500"/>
+              </a:spcBef>
+              <a:buFont typeface="Arial" panose="020B0604020202020204" pitchFamily="34" charset="0"/>
+              <a:buChar char="•"/>
+              <a:defRPr sz="1800" kern="1200">
+                <a:solidFill>
+                  <a:schemeClr val="tx1"/>
+                </a:solidFill>
+                <a:latin typeface="+mn-lt"/>
+                <a:ea typeface="+mn-ea"/>
+                <a:cs typeface="+mn-cs"/>
+              </a:defRPr>
+            </a:lvl7pPr>
+            <a:lvl8pPr marL="3429000" indent="-228600" algn="l" defTabSz="914400" rtl="0" eaLnBrk="1" latinLnBrk="0" hangingPunct="1">
+              <a:lnSpc>
+                <a:spcPct val="90000"/>
+              </a:lnSpc>
+              <a:spcBef>
+                <a:spcPts val="500"/>
+              </a:spcBef>
+              <a:buFont typeface="Arial" panose="020B0604020202020204" pitchFamily="34" charset="0"/>
+              <a:buChar char="•"/>
+              <a:defRPr sz="1800" kern="1200">
+                <a:solidFill>
+                  <a:schemeClr val="tx1"/>
+                </a:solidFill>
+                <a:latin typeface="+mn-lt"/>
+                <a:ea typeface="+mn-ea"/>
+                <a:cs typeface="+mn-cs"/>
+              </a:defRPr>
+            </a:lvl8pPr>
+            <a:lvl9pPr marL="3886200" indent="-228600" algn="l" defTabSz="914400" rtl="0" eaLnBrk="1" latinLnBrk="0" hangingPunct="1">
+              <a:lnSpc>
+                <a:spcPct val="90000"/>
+              </a:lnSpc>
+              <a:spcBef>
+                <a:spcPts val="500"/>
+              </a:spcBef>
+              <a:buFont typeface="Arial" panose="020B0604020202020204" pitchFamily="34" charset="0"/>
+              <a:buChar char="•"/>
+              <a:defRPr sz="1800" kern="1200">
+                <a:solidFill>
+                  <a:schemeClr val="tx1"/>
+                </a:solidFill>
+                <a:latin typeface="+mn-lt"/>
+                <a:ea typeface="+mn-ea"/>
+                <a:cs typeface="+mn-cs"/>
+              </a:defRPr>
+            </a:lvl9pPr>
+          </a:lstStyle>
+          <a:p>
+            <a:pPr marL="342900" indent="-342900" eaLnBrk="0" fontAlgn="base" hangingPunct="0">
+              <a:lnSpc>
+                <a:spcPct val="150000"/>
+              </a:lnSpc>
+              <a:spcBef>
+                <a:spcPct val="20000"/>
+              </a:spcBef>
+              <a:spcAft>
+                <a:spcPct val="0"/>
+              </a:spcAft>
+              <a:buClr>
+                <a:schemeClr val="accent1"/>
+              </a:buClr>
+              <a:buBlip>
+                <a:blip r:embed="rId2"/>
+              </a:buBlip>
+            </a:pPr>
+            <a:r>
+              <a:rPr lang="en-US" sz="2200" dirty="0" smtClean="0">
+                <a:solidFill>
+                  <a:srgbClr val="5F5F5F"/>
+                </a:solidFill>
+              </a:rPr>
+              <a:t>Goal</a:t>
+            </a:r>
+          </a:p>
+          <a:p>
+            <a:pPr marL="342900" indent="-342900" eaLnBrk="0" fontAlgn="base" hangingPunct="0">
+              <a:lnSpc>
+                <a:spcPct val="150000"/>
+              </a:lnSpc>
+              <a:spcBef>
+                <a:spcPct val="20000"/>
+              </a:spcBef>
+              <a:spcAft>
+                <a:spcPct val="0"/>
+              </a:spcAft>
+              <a:buClr>
+                <a:schemeClr val="accent1"/>
+              </a:buClr>
+              <a:buBlip>
+                <a:blip r:embed="rId2"/>
+              </a:buBlip>
+            </a:pPr>
+            <a:r>
+              <a:rPr lang="en-US" sz="2200" dirty="0" smtClean="0">
+                <a:solidFill>
+                  <a:srgbClr val="5F5F5F"/>
+                </a:solidFill>
+              </a:rPr>
+              <a:t>Load and metrics</a:t>
+            </a:r>
+          </a:p>
+          <a:p>
+            <a:pPr marL="342900" indent="-342900" eaLnBrk="0" fontAlgn="base" hangingPunct="0">
+              <a:lnSpc>
+                <a:spcPct val="150000"/>
+              </a:lnSpc>
+              <a:spcBef>
+                <a:spcPct val="20000"/>
+              </a:spcBef>
+              <a:spcAft>
+                <a:spcPct val="0"/>
+              </a:spcAft>
+              <a:buClr>
+                <a:schemeClr val="accent1"/>
+              </a:buClr>
+              <a:buBlip>
+                <a:blip r:embed="rId2"/>
+              </a:buBlip>
+            </a:pPr>
+            <a:r>
+              <a:rPr lang="en-US" sz="2200" dirty="0" smtClean="0">
+                <a:solidFill>
+                  <a:srgbClr val="5F5F5F"/>
+                </a:solidFill>
+              </a:rPr>
+              <a:t>Factors</a:t>
+            </a:r>
+          </a:p>
+          <a:p>
+            <a:pPr marL="342900" indent="-342900" eaLnBrk="0" fontAlgn="base" hangingPunct="0">
+              <a:lnSpc>
+                <a:spcPct val="150000"/>
+              </a:lnSpc>
+              <a:spcBef>
+                <a:spcPct val="20000"/>
+              </a:spcBef>
+              <a:spcAft>
+                <a:spcPct val="0"/>
+              </a:spcAft>
+              <a:buClr>
+                <a:schemeClr val="accent1"/>
+              </a:buClr>
+              <a:buBlip>
+                <a:blip r:embed="rId2"/>
+              </a:buBlip>
+            </a:pPr>
+            <a:r>
+              <a:rPr lang="en-US" sz="2200" dirty="0" smtClean="0">
+                <a:solidFill>
+                  <a:srgbClr val="5F5F5F"/>
+                </a:solidFill>
+              </a:rPr>
+              <a:t>Method</a:t>
+            </a:r>
+          </a:p>
+          <a:p>
+            <a:pPr lvl="1">
+              <a:lnSpc>
+                <a:spcPct val="150000"/>
+              </a:lnSpc>
+              <a:buClr>
+                <a:schemeClr val="accent1"/>
+              </a:buClr>
+              <a:buFont typeface="Wingdings" panose="05000000000000000000" pitchFamily="2" charset="2"/>
+              <a:buChar char="§"/>
+            </a:pPr>
+            <a:endParaRPr lang="en-US" sz="2200" dirty="0" smtClean="0"/>
+          </a:p>
+          <a:p>
+            <a:pPr>
+              <a:lnSpc>
+                <a:spcPct val="150000"/>
+              </a:lnSpc>
+            </a:pPr>
+            <a:endParaRPr lang="fr-CH" sz="2200" dirty="0"/>
+          </a:p>
+        </p:txBody>
+      </p:sp>
     </p:spTree>
     <p:extLst>
       <p:ext uri="{BB962C8B-B14F-4D97-AF65-F5344CB8AC3E}">
@@ -3160,6 +3984,13 @@
   <p:clrMapOvr>
     <a:masterClrMapping/>
   </p:clrMapOvr>
+  <p:timing>
+    <p:tnLst>
+      <p:par>
+        <p:cTn id="1" dur="indefinite" restart="never" nodeType="tmRoot"/>
+      </p:par>
+    </p:tnLst>
+  </p:timing>
 </p:sld>
 </file>
 
@@ -3183,51 +4014,2371 @@
       <p:sp>
         <p:nvSpPr>
           <p:cNvPr id="2" name="Titre 1"/>
-          <p:cNvSpPr>
-            <a:spLocks noGrp="1"/>
-          </p:cNvSpPr>
-          <p:nvPr>
-            <p:ph type="title"/>
-          </p:nvPr>
-        </p:nvSpPr>
-        <p:spPr/>
-        <p:txBody>
-          <a:bodyPr/>
-          <a:lstStyle/>
-          <a:p>
-            <a:endParaRPr lang="fr-CH"/>
-          </a:p>
-        </p:txBody>
-      </p:sp>
-      <p:sp>
-        <p:nvSpPr>
-          <p:cNvPr id="3" name="Espace réservé du contenu 2"/>
-          <p:cNvSpPr>
-            <a:spLocks noGrp="1"/>
-          </p:cNvSpPr>
-          <p:nvPr>
-            <p:ph idx="1"/>
-          </p:nvPr>
-        </p:nvSpPr>
-        <p:spPr/>
-        <p:txBody>
-          <a:bodyPr/>
-          <a:lstStyle/>
-          <a:p>
-            <a:endParaRPr lang="fr-CH"/>
+          <p:cNvSpPr txBox="1">
+            <a:spLocks/>
+          </p:cNvSpPr>
+          <p:nvPr/>
+        </p:nvSpPr>
+        <p:spPr>
+          <a:xfrm>
+            <a:off x="0" y="409131"/>
+            <a:ext cx="12192000" cy="605853"/>
+          </a:xfrm>
+          <a:prstGeom prst="rect">
+            <a:avLst/>
+          </a:prstGeom>
+        </p:spPr>
+        <p:txBody>
+          <a:bodyPr vert="horz" lIns="91440" tIns="45720" rIns="91440" bIns="45720" rtlCol="0" anchor="ctr">
+            <a:noAutofit/>
+          </a:bodyPr>
+          <a:lstStyle>
+            <a:lvl1pPr algn="l" defTabSz="914400" rtl="0" eaLnBrk="1" latinLnBrk="0" hangingPunct="1">
+              <a:lnSpc>
+                <a:spcPct val="90000"/>
+              </a:lnSpc>
+              <a:spcBef>
+                <a:spcPct val="0"/>
+              </a:spcBef>
+              <a:buNone/>
+              <a:defRPr sz="4400" kern="1200">
+                <a:solidFill>
+                  <a:schemeClr val="tx1"/>
+                </a:solidFill>
+                <a:latin typeface="+mj-lt"/>
+                <a:ea typeface="+mj-ea"/>
+                <a:cs typeface="+mj-cs"/>
+              </a:defRPr>
+            </a:lvl1pPr>
+          </a:lstStyle>
+          <a:p>
+            <a:pPr algn="ctr" eaLnBrk="0" fontAlgn="base" hangingPunct="0">
+              <a:spcAft>
+                <a:spcPct val="0"/>
+              </a:spcAft>
+            </a:pPr>
+            <a:r>
+              <a:rPr lang="fr-CH" altLang="en-US" sz="3600" b="1" dirty="0" smtClean="0">
+                <a:solidFill>
+                  <a:srgbClr val="0099CC"/>
+                </a:solidFill>
+                <a:latin typeface="+mn-lt"/>
+              </a:rPr>
+              <a:t>Goal</a:t>
+            </a:r>
+          </a:p>
+        </p:txBody>
+      </p:sp>
+      <p:sp>
+        <p:nvSpPr>
+          <p:cNvPr id="3" name="Sous-titre 2"/>
+          <p:cNvSpPr txBox="1">
+            <a:spLocks/>
+          </p:cNvSpPr>
+          <p:nvPr/>
+        </p:nvSpPr>
+        <p:spPr>
+          <a:xfrm>
+            <a:off x="777240" y="2065846"/>
+            <a:ext cx="10671048" cy="2881058"/>
+          </a:xfrm>
+          <a:prstGeom prst="rect">
+            <a:avLst/>
+          </a:prstGeom>
+        </p:spPr>
+        <p:txBody>
+          <a:bodyPr vert="horz" lIns="91440" tIns="45720" rIns="91440" bIns="45720" rtlCol="0">
+            <a:noAutofit/>
+          </a:bodyPr>
+          <a:lstStyle>
+            <a:lvl1pPr marL="228600" indent="-228600" algn="l" defTabSz="914400" rtl="0" eaLnBrk="1" latinLnBrk="0" hangingPunct="1">
+              <a:lnSpc>
+                <a:spcPct val="90000"/>
+              </a:lnSpc>
+              <a:spcBef>
+                <a:spcPts val="1000"/>
+              </a:spcBef>
+              <a:buFont typeface="Arial" panose="020B0604020202020204" pitchFamily="34" charset="0"/>
+              <a:buChar char="•"/>
+              <a:defRPr sz="2800" kern="1200">
+                <a:solidFill>
+                  <a:schemeClr val="tx1"/>
+                </a:solidFill>
+                <a:latin typeface="+mn-lt"/>
+                <a:ea typeface="+mn-ea"/>
+                <a:cs typeface="+mn-cs"/>
+              </a:defRPr>
+            </a:lvl1pPr>
+            <a:lvl2pPr marL="685800" indent="-228600" algn="l" defTabSz="914400" rtl="0" eaLnBrk="1" latinLnBrk="0" hangingPunct="1">
+              <a:lnSpc>
+                <a:spcPct val="90000"/>
+              </a:lnSpc>
+              <a:spcBef>
+                <a:spcPts val="500"/>
+              </a:spcBef>
+              <a:buFont typeface="Arial" panose="020B0604020202020204" pitchFamily="34" charset="0"/>
+              <a:buChar char="•"/>
+              <a:defRPr sz="2400" kern="1200">
+                <a:solidFill>
+                  <a:schemeClr val="tx1"/>
+                </a:solidFill>
+                <a:latin typeface="+mn-lt"/>
+                <a:ea typeface="+mn-ea"/>
+                <a:cs typeface="+mn-cs"/>
+              </a:defRPr>
+            </a:lvl2pPr>
+            <a:lvl3pPr marL="1143000" indent="-228600" algn="l" defTabSz="914400" rtl="0" eaLnBrk="1" latinLnBrk="0" hangingPunct="1">
+              <a:lnSpc>
+                <a:spcPct val="90000"/>
+              </a:lnSpc>
+              <a:spcBef>
+                <a:spcPts val="500"/>
+              </a:spcBef>
+              <a:buFont typeface="Arial" panose="020B0604020202020204" pitchFamily="34" charset="0"/>
+              <a:buChar char="•"/>
+              <a:defRPr sz="2000" kern="1200">
+                <a:solidFill>
+                  <a:schemeClr val="tx1"/>
+                </a:solidFill>
+                <a:latin typeface="+mn-lt"/>
+                <a:ea typeface="+mn-ea"/>
+                <a:cs typeface="+mn-cs"/>
+              </a:defRPr>
+            </a:lvl3pPr>
+            <a:lvl4pPr marL="1600200" indent="-228600" algn="l" defTabSz="914400" rtl="0" eaLnBrk="1" latinLnBrk="0" hangingPunct="1">
+              <a:lnSpc>
+                <a:spcPct val="90000"/>
+              </a:lnSpc>
+              <a:spcBef>
+                <a:spcPts val="500"/>
+              </a:spcBef>
+              <a:buFont typeface="Arial" panose="020B0604020202020204" pitchFamily="34" charset="0"/>
+              <a:buChar char="•"/>
+              <a:defRPr sz="1800" kern="1200">
+                <a:solidFill>
+                  <a:schemeClr val="tx1"/>
+                </a:solidFill>
+                <a:latin typeface="+mn-lt"/>
+                <a:ea typeface="+mn-ea"/>
+                <a:cs typeface="+mn-cs"/>
+              </a:defRPr>
+            </a:lvl4pPr>
+            <a:lvl5pPr marL="2057400" indent="-228600" algn="l" defTabSz="914400" rtl="0" eaLnBrk="1" latinLnBrk="0" hangingPunct="1">
+              <a:lnSpc>
+                <a:spcPct val="90000"/>
+              </a:lnSpc>
+              <a:spcBef>
+                <a:spcPts val="500"/>
+              </a:spcBef>
+              <a:buFont typeface="Arial" panose="020B0604020202020204" pitchFamily="34" charset="0"/>
+              <a:buChar char="•"/>
+              <a:defRPr sz="1800" kern="1200">
+                <a:solidFill>
+                  <a:schemeClr val="tx1"/>
+                </a:solidFill>
+                <a:latin typeface="+mn-lt"/>
+                <a:ea typeface="+mn-ea"/>
+                <a:cs typeface="+mn-cs"/>
+              </a:defRPr>
+            </a:lvl5pPr>
+            <a:lvl6pPr marL="2514600" indent="-228600" algn="l" defTabSz="914400" rtl="0" eaLnBrk="1" latinLnBrk="0" hangingPunct="1">
+              <a:lnSpc>
+                <a:spcPct val="90000"/>
+              </a:lnSpc>
+              <a:spcBef>
+                <a:spcPts val="500"/>
+              </a:spcBef>
+              <a:buFont typeface="Arial" panose="020B0604020202020204" pitchFamily="34" charset="0"/>
+              <a:buChar char="•"/>
+              <a:defRPr sz="1800" kern="1200">
+                <a:solidFill>
+                  <a:schemeClr val="tx1"/>
+                </a:solidFill>
+                <a:latin typeface="+mn-lt"/>
+                <a:ea typeface="+mn-ea"/>
+                <a:cs typeface="+mn-cs"/>
+              </a:defRPr>
+            </a:lvl6pPr>
+            <a:lvl7pPr marL="2971800" indent="-228600" algn="l" defTabSz="914400" rtl="0" eaLnBrk="1" latinLnBrk="0" hangingPunct="1">
+              <a:lnSpc>
+                <a:spcPct val="90000"/>
+              </a:lnSpc>
+              <a:spcBef>
+                <a:spcPts val="500"/>
+              </a:spcBef>
+              <a:buFont typeface="Arial" panose="020B0604020202020204" pitchFamily="34" charset="0"/>
+              <a:buChar char="•"/>
+              <a:defRPr sz="1800" kern="1200">
+                <a:solidFill>
+                  <a:schemeClr val="tx1"/>
+                </a:solidFill>
+                <a:latin typeface="+mn-lt"/>
+                <a:ea typeface="+mn-ea"/>
+                <a:cs typeface="+mn-cs"/>
+              </a:defRPr>
+            </a:lvl7pPr>
+            <a:lvl8pPr marL="3429000" indent="-228600" algn="l" defTabSz="914400" rtl="0" eaLnBrk="1" latinLnBrk="0" hangingPunct="1">
+              <a:lnSpc>
+                <a:spcPct val="90000"/>
+              </a:lnSpc>
+              <a:spcBef>
+                <a:spcPts val="500"/>
+              </a:spcBef>
+              <a:buFont typeface="Arial" panose="020B0604020202020204" pitchFamily="34" charset="0"/>
+              <a:buChar char="•"/>
+              <a:defRPr sz="1800" kern="1200">
+                <a:solidFill>
+                  <a:schemeClr val="tx1"/>
+                </a:solidFill>
+                <a:latin typeface="+mn-lt"/>
+                <a:ea typeface="+mn-ea"/>
+                <a:cs typeface="+mn-cs"/>
+              </a:defRPr>
+            </a:lvl8pPr>
+            <a:lvl9pPr marL="3886200" indent="-228600" algn="l" defTabSz="914400" rtl="0" eaLnBrk="1" latinLnBrk="0" hangingPunct="1">
+              <a:lnSpc>
+                <a:spcPct val="90000"/>
+              </a:lnSpc>
+              <a:spcBef>
+                <a:spcPts val="500"/>
+              </a:spcBef>
+              <a:buFont typeface="Arial" panose="020B0604020202020204" pitchFamily="34" charset="0"/>
+              <a:buChar char="•"/>
+              <a:defRPr sz="1800" kern="1200">
+                <a:solidFill>
+                  <a:schemeClr val="tx1"/>
+                </a:solidFill>
+                <a:latin typeface="+mn-lt"/>
+                <a:ea typeface="+mn-ea"/>
+                <a:cs typeface="+mn-cs"/>
+              </a:defRPr>
+            </a:lvl9pPr>
+          </a:lstStyle>
+          <a:p>
+            <a:pPr marL="342900" indent="-342900" eaLnBrk="0" fontAlgn="base" hangingPunct="0">
+              <a:lnSpc>
+                <a:spcPct val="150000"/>
+              </a:lnSpc>
+              <a:spcBef>
+                <a:spcPct val="20000"/>
+              </a:spcBef>
+              <a:spcAft>
+                <a:spcPct val="0"/>
+              </a:spcAft>
+              <a:buClr>
+                <a:schemeClr val="accent1"/>
+              </a:buClr>
+              <a:buBlip>
+                <a:blip r:embed="rId2"/>
+              </a:buBlip>
+            </a:pPr>
+            <a:r>
+              <a:rPr lang="en-US" sz="2200" dirty="0" smtClean="0">
+                <a:solidFill>
+                  <a:srgbClr val="5F5F5F"/>
+                </a:solidFill>
+              </a:rPr>
+              <a:t>Evaluate the performance of all the architectures of In-Memory Data-Stores that we built</a:t>
+            </a:r>
+          </a:p>
+          <a:p>
+            <a:pPr marL="342900" indent="-342900" eaLnBrk="0" fontAlgn="base" hangingPunct="0">
+              <a:lnSpc>
+                <a:spcPct val="150000"/>
+              </a:lnSpc>
+              <a:spcBef>
+                <a:spcPct val="20000"/>
+              </a:spcBef>
+              <a:spcAft>
+                <a:spcPct val="0"/>
+              </a:spcAft>
+              <a:buClr>
+                <a:schemeClr val="accent1"/>
+              </a:buClr>
+              <a:buBlip>
+                <a:blip r:embed="rId2"/>
+              </a:buBlip>
+            </a:pPr>
+            <a:r>
+              <a:rPr lang="en-US" sz="2200" dirty="0" smtClean="0">
+                <a:solidFill>
+                  <a:srgbClr val="5F5F5F"/>
+                </a:solidFill>
+              </a:rPr>
+              <a:t>Compare the performances between the different architectures</a:t>
+            </a:r>
+          </a:p>
+          <a:p>
+            <a:pPr marL="342900" indent="-342900" eaLnBrk="0" fontAlgn="base" hangingPunct="0">
+              <a:lnSpc>
+                <a:spcPct val="150000"/>
+              </a:lnSpc>
+              <a:spcBef>
+                <a:spcPct val="20000"/>
+              </a:spcBef>
+              <a:spcAft>
+                <a:spcPct val="0"/>
+              </a:spcAft>
+              <a:buClr>
+                <a:schemeClr val="accent1"/>
+              </a:buClr>
+              <a:buBlip>
+                <a:blip r:embed="rId2"/>
+              </a:buBlip>
+            </a:pPr>
+            <a:r>
+              <a:rPr lang="en-US" sz="2200" dirty="0" smtClean="0">
+                <a:solidFill>
+                  <a:srgbClr val="5F5F5F"/>
+                </a:solidFill>
+              </a:rPr>
+              <a:t>Give suitable architecture depending on average clients served</a:t>
+            </a:r>
+          </a:p>
+          <a:p>
+            <a:pPr marL="342900" indent="-342900" eaLnBrk="0" fontAlgn="base" hangingPunct="0">
+              <a:lnSpc>
+                <a:spcPct val="150000"/>
+              </a:lnSpc>
+              <a:spcBef>
+                <a:spcPct val="20000"/>
+              </a:spcBef>
+              <a:spcAft>
+                <a:spcPct val="0"/>
+              </a:spcAft>
+              <a:buClr>
+                <a:schemeClr val="accent1"/>
+              </a:buClr>
+              <a:buBlip>
+                <a:blip r:embed="rId2"/>
+              </a:buBlip>
+            </a:pPr>
+            <a:r>
+              <a:rPr lang="en-US" sz="2200" dirty="0" smtClean="0">
+                <a:solidFill>
+                  <a:srgbClr val="5F5F5F"/>
+                </a:solidFill>
+              </a:rPr>
+              <a:t>Performance analysis will be, in this case, analysis of the average waiting time of a client for an answer after performing a request to the data-store</a:t>
+            </a:r>
+          </a:p>
+          <a:p>
+            <a:pPr lvl="1">
+              <a:lnSpc>
+                <a:spcPct val="150000"/>
+              </a:lnSpc>
+              <a:buClr>
+                <a:schemeClr val="accent1"/>
+              </a:buClr>
+              <a:buFont typeface="Wingdings" panose="05000000000000000000" pitchFamily="2" charset="2"/>
+              <a:buChar char="§"/>
+            </a:pPr>
+            <a:endParaRPr lang="en-US" sz="2200" dirty="0" smtClean="0"/>
+          </a:p>
+          <a:p>
+            <a:pPr>
+              <a:lnSpc>
+                <a:spcPct val="150000"/>
+              </a:lnSpc>
+            </a:pPr>
+            <a:endParaRPr lang="fr-CH" sz="2200" dirty="0"/>
           </a:p>
         </p:txBody>
       </p:sp>
     </p:spTree>
     <p:extLst>
       <p:ext uri="{BB962C8B-B14F-4D97-AF65-F5344CB8AC3E}">
-        <p14:creationId xmlns:p14="http://schemas.microsoft.com/office/powerpoint/2010/main" val="1178296646"/>
+        <p14:creationId xmlns:p14="http://schemas.microsoft.com/office/powerpoint/2010/main" val="1528385883"/>
       </p:ext>
     </p:extLst>
   </p:cSld>
   <p:clrMapOvr>
     <a:masterClrMapping/>
   </p:clrMapOvr>
+  <p:timing>
+    <p:tnLst>
+      <p:par>
+        <p:cTn id="1" dur="indefinite" restart="never" nodeType="tmRoot"/>
+      </p:par>
+    </p:tnLst>
+  </p:timing>
+</p:sld>
+</file>
+
+<file path=ppt/slides/slide4.xml><?xml version="1.0" encoding="utf-8"?>
+<p:sld xmlns:a="http://schemas.openxmlformats.org/drawingml/2006/main" xmlns:r="http://schemas.openxmlformats.org/officeDocument/2006/relationships" xmlns:p="http://schemas.openxmlformats.org/presentationml/2006/main">
+  <p:cSld>
+    <p:spTree>
+      <p:nvGrpSpPr>
+        <p:cNvPr id="1" name=""/>
+        <p:cNvGrpSpPr/>
+        <p:nvPr/>
+      </p:nvGrpSpPr>
+      <p:grpSpPr>
+        <a:xfrm>
+          <a:off x="0" y="0"/>
+          <a:ext cx="0" cy="0"/>
+          <a:chOff x="0" y="0"/>
+          <a:chExt cx="0" cy="0"/>
+        </a:xfrm>
+      </p:grpSpPr>
+      <p:sp>
+        <p:nvSpPr>
+          <p:cNvPr id="2" name="Titre 1"/>
+          <p:cNvSpPr txBox="1">
+            <a:spLocks/>
+          </p:cNvSpPr>
+          <p:nvPr/>
+        </p:nvSpPr>
+        <p:spPr>
+          <a:xfrm>
+            <a:off x="0" y="409131"/>
+            <a:ext cx="12192000" cy="605853"/>
+          </a:xfrm>
+          <a:prstGeom prst="rect">
+            <a:avLst/>
+          </a:prstGeom>
+        </p:spPr>
+        <p:txBody>
+          <a:bodyPr vert="horz" lIns="91440" tIns="45720" rIns="91440" bIns="45720" rtlCol="0" anchor="ctr">
+            <a:noAutofit/>
+          </a:bodyPr>
+          <a:lstStyle>
+            <a:lvl1pPr algn="l" defTabSz="914400" rtl="0" eaLnBrk="1" latinLnBrk="0" hangingPunct="1">
+              <a:lnSpc>
+                <a:spcPct val="90000"/>
+              </a:lnSpc>
+              <a:spcBef>
+                <a:spcPct val="0"/>
+              </a:spcBef>
+              <a:buNone/>
+              <a:defRPr sz="4400" kern="1200">
+                <a:solidFill>
+                  <a:schemeClr val="tx1"/>
+                </a:solidFill>
+                <a:latin typeface="+mj-lt"/>
+                <a:ea typeface="+mj-ea"/>
+                <a:cs typeface="+mj-cs"/>
+              </a:defRPr>
+            </a:lvl1pPr>
+          </a:lstStyle>
+          <a:p>
+            <a:pPr algn="ctr" eaLnBrk="0" fontAlgn="base" hangingPunct="0">
+              <a:spcAft>
+                <a:spcPct val="0"/>
+              </a:spcAft>
+            </a:pPr>
+            <a:r>
+              <a:rPr lang="fr-CH" altLang="en-US" sz="3600" b="1" dirty="0" err="1" smtClean="0">
+                <a:solidFill>
+                  <a:srgbClr val="0099CC"/>
+                </a:solidFill>
+                <a:latin typeface="+mn-lt"/>
+              </a:rPr>
+              <a:t>Load</a:t>
+            </a:r>
+            <a:r>
+              <a:rPr lang="fr-CH" altLang="en-US" sz="3600" b="1" dirty="0" smtClean="0">
+                <a:solidFill>
+                  <a:srgbClr val="0099CC"/>
+                </a:solidFill>
+                <a:latin typeface="+mn-lt"/>
+              </a:rPr>
+              <a:t> and </a:t>
+            </a:r>
+            <a:r>
+              <a:rPr lang="fr-CH" altLang="en-US" sz="3600" b="1" dirty="0" err="1" smtClean="0">
+                <a:solidFill>
+                  <a:srgbClr val="0099CC"/>
+                </a:solidFill>
+                <a:latin typeface="+mn-lt"/>
+              </a:rPr>
+              <a:t>metrics</a:t>
+            </a:r>
+            <a:endParaRPr lang="fr-CH" altLang="en-US" sz="3600" b="1" dirty="0" smtClean="0">
+              <a:solidFill>
+                <a:srgbClr val="0099CC"/>
+              </a:solidFill>
+              <a:latin typeface="+mn-lt"/>
+            </a:endParaRPr>
+          </a:p>
+        </p:txBody>
+      </p:sp>
+      <p:sp>
+        <p:nvSpPr>
+          <p:cNvPr id="3" name="Sous-titre 2"/>
+          <p:cNvSpPr txBox="1">
+            <a:spLocks/>
+          </p:cNvSpPr>
+          <p:nvPr/>
+        </p:nvSpPr>
+        <p:spPr>
+          <a:xfrm>
+            <a:off x="777240" y="2065846"/>
+            <a:ext cx="10579608" cy="2881058"/>
+          </a:xfrm>
+          <a:prstGeom prst="rect">
+            <a:avLst/>
+          </a:prstGeom>
+        </p:spPr>
+        <p:txBody>
+          <a:bodyPr vert="horz" lIns="91440" tIns="45720" rIns="91440" bIns="45720" rtlCol="0">
+            <a:noAutofit/>
+          </a:bodyPr>
+          <a:lstStyle>
+            <a:lvl1pPr marL="228600" indent="-228600" algn="l" defTabSz="914400" rtl="0" eaLnBrk="1" latinLnBrk="0" hangingPunct="1">
+              <a:lnSpc>
+                <a:spcPct val="90000"/>
+              </a:lnSpc>
+              <a:spcBef>
+                <a:spcPts val="1000"/>
+              </a:spcBef>
+              <a:buFont typeface="Arial" panose="020B0604020202020204" pitchFamily="34" charset="0"/>
+              <a:buChar char="•"/>
+              <a:defRPr sz="2800" kern="1200">
+                <a:solidFill>
+                  <a:schemeClr val="tx1"/>
+                </a:solidFill>
+                <a:latin typeface="+mn-lt"/>
+                <a:ea typeface="+mn-ea"/>
+                <a:cs typeface="+mn-cs"/>
+              </a:defRPr>
+            </a:lvl1pPr>
+            <a:lvl2pPr marL="685800" indent="-228600" algn="l" defTabSz="914400" rtl="0" eaLnBrk="1" latinLnBrk="0" hangingPunct="1">
+              <a:lnSpc>
+                <a:spcPct val="90000"/>
+              </a:lnSpc>
+              <a:spcBef>
+                <a:spcPts val="500"/>
+              </a:spcBef>
+              <a:buFont typeface="Arial" panose="020B0604020202020204" pitchFamily="34" charset="0"/>
+              <a:buChar char="•"/>
+              <a:defRPr sz="2400" kern="1200">
+                <a:solidFill>
+                  <a:schemeClr val="tx1"/>
+                </a:solidFill>
+                <a:latin typeface="+mn-lt"/>
+                <a:ea typeface="+mn-ea"/>
+                <a:cs typeface="+mn-cs"/>
+              </a:defRPr>
+            </a:lvl2pPr>
+            <a:lvl3pPr marL="1143000" indent="-228600" algn="l" defTabSz="914400" rtl="0" eaLnBrk="1" latinLnBrk="0" hangingPunct="1">
+              <a:lnSpc>
+                <a:spcPct val="90000"/>
+              </a:lnSpc>
+              <a:spcBef>
+                <a:spcPts val="500"/>
+              </a:spcBef>
+              <a:buFont typeface="Arial" panose="020B0604020202020204" pitchFamily="34" charset="0"/>
+              <a:buChar char="•"/>
+              <a:defRPr sz="2000" kern="1200">
+                <a:solidFill>
+                  <a:schemeClr val="tx1"/>
+                </a:solidFill>
+                <a:latin typeface="+mn-lt"/>
+                <a:ea typeface="+mn-ea"/>
+                <a:cs typeface="+mn-cs"/>
+              </a:defRPr>
+            </a:lvl3pPr>
+            <a:lvl4pPr marL="1600200" indent="-228600" algn="l" defTabSz="914400" rtl="0" eaLnBrk="1" latinLnBrk="0" hangingPunct="1">
+              <a:lnSpc>
+                <a:spcPct val="90000"/>
+              </a:lnSpc>
+              <a:spcBef>
+                <a:spcPts val="500"/>
+              </a:spcBef>
+              <a:buFont typeface="Arial" panose="020B0604020202020204" pitchFamily="34" charset="0"/>
+              <a:buChar char="•"/>
+              <a:defRPr sz="1800" kern="1200">
+                <a:solidFill>
+                  <a:schemeClr val="tx1"/>
+                </a:solidFill>
+                <a:latin typeface="+mn-lt"/>
+                <a:ea typeface="+mn-ea"/>
+                <a:cs typeface="+mn-cs"/>
+              </a:defRPr>
+            </a:lvl4pPr>
+            <a:lvl5pPr marL="2057400" indent="-228600" algn="l" defTabSz="914400" rtl="0" eaLnBrk="1" latinLnBrk="0" hangingPunct="1">
+              <a:lnSpc>
+                <a:spcPct val="90000"/>
+              </a:lnSpc>
+              <a:spcBef>
+                <a:spcPts val="500"/>
+              </a:spcBef>
+              <a:buFont typeface="Arial" panose="020B0604020202020204" pitchFamily="34" charset="0"/>
+              <a:buChar char="•"/>
+              <a:defRPr sz="1800" kern="1200">
+                <a:solidFill>
+                  <a:schemeClr val="tx1"/>
+                </a:solidFill>
+                <a:latin typeface="+mn-lt"/>
+                <a:ea typeface="+mn-ea"/>
+                <a:cs typeface="+mn-cs"/>
+              </a:defRPr>
+            </a:lvl5pPr>
+            <a:lvl6pPr marL="2514600" indent="-228600" algn="l" defTabSz="914400" rtl="0" eaLnBrk="1" latinLnBrk="0" hangingPunct="1">
+              <a:lnSpc>
+                <a:spcPct val="90000"/>
+              </a:lnSpc>
+              <a:spcBef>
+                <a:spcPts val="500"/>
+              </a:spcBef>
+              <a:buFont typeface="Arial" panose="020B0604020202020204" pitchFamily="34" charset="0"/>
+              <a:buChar char="•"/>
+              <a:defRPr sz="1800" kern="1200">
+                <a:solidFill>
+                  <a:schemeClr val="tx1"/>
+                </a:solidFill>
+                <a:latin typeface="+mn-lt"/>
+                <a:ea typeface="+mn-ea"/>
+                <a:cs typeface="+mn-cs"/>
+              </a:defRPr>
+            </a:lvl6pPr>
+            <a:lvl7pPr marL="2971800" indent="-228600" algn="l" defTabSz="914400" rtl="0" eaLnBrk="1" latinLnBrk="0" hangingPunct="1">
+              <a:lnSpc>
+                <a:spcPct val="90000"/>
+              </a:lnSpc>
+              <a:spcBef>
+                <a:spcPts val="500"/>
+              </a:spcBef>
+              <a:buFont typeface="Arial" panose="020B0604020202020204" pitchFamily="34" charset="0"/>
+              <a:buChar char="•"/>
+              <a:defRPr sz="1800" kern="1200">
+                <a:solidFill>
+                  <a:schemeClr val="tx1"/>
+                </a:solidFill>
+                <a:latin typeface="+mn-lt"/>
+                <a:ea typeface="+mn-ea"/>
+                <a:cs typeface="+mn-cs"/>
+              </a:defRPr>
+            </a:lvl7pPr>
+            <a:lvl8pPr marL="3429000" indent="-228600" algn="l" defTabSz="914400" rtl="0" eaLnBrk="1" latinLnBrk="0" hangingPunct="1">
+              <a:lnSpc>
+                <a:spcPct val="90000"/>
+              </a:lnSpc>
+              <a:spcBef>
+                <a:spcPts val="500"/>
+              </a:spcBef>
+              <a:buFont typeface="Arial" panose="020B0604020202020204" pitchFamily="34" charset="0"/>
+              <a:buChar char="•"/>
+              <a:defRPr sz="1800" kern="1200">
+                <a:solidFill>
+                  <a:schemeClr val="tx1"/>
+                </a:solidFill>
+                <a:latin typeface="+mn-lt"/>
+                <a:ea typeface="+mn-ea"/>
+                <a:cs typeface="+mn-cs"/>
+              </a:defRPr>
+            </a:lvl8pPr>
+            <a:lvl9pPr marL="3886200" indent="-228600" algn="l" defTabSz="914400" rtl="0" eaLnBrk="1" latinLnBrk="0" hangingPunct="1">
+              <a:lnSpc>
+                <a:spcPct val="90000"/>
+              </a:lnSpc>
+              <a:spcBef>
+                <a:spcPts val="500"/>
+              </a:spcBef>
+              <a:buFont typeface="Arial" panose="020B0604020202020204" pitchFamily="34" charset="0"/>
+              <a:buChar char="•"/>
+              <a:defRPr sz="1800" kern="1200">
+                <a:solidFill>
+                  <a:schemeClr val="tx1"/>
+                </a:solidFill>
+                <a:latin typeface="+mn-lt"/>
+                <a:ea typeface="+mn-ea"/>
+                <a:cs typeface="+mn-cs"/>
+              </a:defRPr>
+            </a:lvl9pPr>
+          </a:lstStyle>
+          <a:p>
+            <a:pPr marL="342900" indent="-342900" eaLnBrk="0" fontAlgn="base" hangingPunct="0">
+              <a:lnSpc>
+                <a:spcPct val="150000"/>
+              </a:lnSpc>
+              <a:spcBef>
+                <a:spcPct val="20000"/>
+              </a:spcBef>
+              <a:spcAft>
+                <a:spcPct val="0"/>
+              </a:spcAft>
+              <a:buClr>
+                <a:schemeClr val="accent1"/>
+              </a:buClr>
+              <a:buBlip>
+                <a:blip r:embed="rId2"/>
+              </a:buBlip>
+            </a:pPr>
+            <a:r>
+              <a:rPr lang="en-US" sz="2200" dirty="0" smtClean="0">
+                <a:solidFill>
+                  <a:srgbClr val="5F5F5F"/>
+                </a:solidFill>
+              </a:rPr>
+              <a:t>Load generated </a:t>
+            </a:r>
+            <a:r>
+              <a:rPr lang="en-US" sz="2200" dirty="0">
+                <a:solidFill>
+                  <a:srgbClr val="5F5F5F"/>
+                </a:solidFill>
+              </a:rPr>
+              <a:t>by </a:t>
+            </a:r>
+            <a:r>
+              <a:rPr lang="en-US" sz="2200" dirty="0" smtClean="0">
+                <a:solidFill>
+                  <a:srgbClr val="5F5F5F"/>
+                </a:solidFill>
+              </a:rPr>
+              <a:t>benchmarks </a:t>
+            </a:r>
+            <a:r>
+              <a:rPr lang="en-US" sz="2200" dirty="0">
+                <a:solidFill>
+                  <a:srgbClr val="5F5F5F"/>
+                </a:solidFill>
+              </a:rPr>
+              <a:t>that send randomly requests to </a:t>
+            </a:r>
+            <a:r>
+              <a:rPr lang="en-US" sz="2200" dirty="0" smtClean="0">
+                <a:solidFill>
+                  <a:srgbClr val="5F5F5F"/>
+                </a:solidFill>
+              </a:rPr>
+              <a:t>get/set </a:t>
+            </a:r>
+            <a:r>
+              <a:rPr lang="en-US" sz="2200" dirty="0">
+                <a:solidFill>
+                  <a:srgbClr val="5F5F5F"/>
+                </a:solidFill>
+              </a:rPr>
+              <a:t>data with some random key in a range of one hundred </a:t>
+            </a:r>
+            <a:r>
+              <a:rPr lang="en-US" sz="2200" dirty="0" smtClean="0">
+                <a:solidFill>
+                  <a:srgbClr val="5F5F5F"/>
+                </a:solidFill>
+              </a:rPr>
+              <a:t>predefined keys </a:t>
+            </a:r>
+            <a:r>
+              <a:rPr lang="en-US" sz="2200" dirty="0">
+                <a:solidFill>
+                  <a:srgbClr val="5F5F5F"/>
+                </a:solidFill>
+              </a:rPr>
+              <a:t>and with some random value in a range of one hundred </a:t>
+            </a:r>
+            <a:r>
+              <a:rPr lang="en-US" sz="2200" dirty="0" smtClean="0">
+                <a:solidFill>
+                  <a:srgbClr val="5F5F5F"/>
+                </a:solidFill>
+              </a:rPr>
+              <a:t>predefined values.</a:t>
+            </a:r>
+          </a:p>
+          <a:p>
+            <a:pPr marL="0" indent="0" eaLnBrk="0" fontAlgn="base" hangingPunct="0">
+              <a:lnSpc>
+                <a:spcPct val="150000"/>
+              </a:lnSpc>
+              <a:spcBef>
+                <a:spcPct val="20000"/>
+              </a:spcBef>
+              <a:spcAft>
+                <a:spcPct val="0"/>
+              </a:spcAft>
+              <a:buClr>
+                <a:schemeClr val="accent1"/>
+              </a:buClr>
+              <a:buNone/>
+            </a:pPr>
+            <a:endParaRPr lang="en-US" sz="2200" dirty="0" smtClean="0">
+              <a:solidFill>
+                <a:srgbClr val="5F5F5F"/>
+              </a:solidFill>
+            </a:endParaRPr>
+          </a:p>
+          <a:p>
+            <a:pPr marL="342900" indent="-342900" eaLnBrk="0" fontAlgn="base" hangingPunct="0">
+              <a:lnSpc>
+                <a:spcPct val="150000"/>
+              </a:lnSpc>
+              <a:spcBef>
+                <a:spcPct val="20000"/>
+              </a:spcBef>
+              <a:spcAft>
+                <a:spcPct val="0"/>
+              </a:spcAft>
+              <a:buClr>
+                <a:schemeClr val="accent1"/>
+              </a:buClr>
+              <a:buBlip>
+                <a:blip r:embed="rId2"/>
+              </a:buBlip>
+            </a:pPr>
+            <a:r>
+              <a:rPr lang="en-US" sz="2200" dirty="0">
+                <a:solidFill>
+                  <a:srgbClr val="5F5F5F"/>
+                </a:solidFill>
+              </a:rPr>
+              <a:t>Metric </a:t>
+            </a:r>
+            <a:r>
+              <a:rPr lang="en-US" sz="2200" dirty="0" smtClean="0">
+                <a:solidFill>
+                  <a:srgbClr val="5F5F5F"/>
+                </a:solidFill>
+              </a:rPr>
+              <a:t>is to </a:t>
+            </a:r>
+            <a:r>
+              <a:rPr lang="en-US" sz="2200" dirty="0">
+                <a:solidFill>
+                  <a:srgbClr val="5F5F5F"/>
+                </a:solidFill>
+              </a:rPr>
+              <a:t>compare </a:t>
+            </a:r>
+            <a:r>
+              <a:rPr lang="en-US" sz="2200" dirty="0" smtClean="0">
+                <a:solidFill>
+                  <a:srgbClr val="5F5F5F"/>
+                </a:solidFill>
+              </a:rPr>
+              <a:t>between the </a:t>
+            </a:r>
+            <a:r>
+              <a:rPr lang="en-US" sz="2200" dirty="0">
+                <a:solidFill>
+                  <a:srgbClr val="5F5F5F"/>
+                </a:solidFill>
+              </a:rPr>
+              <a:t>different architectures </a:t>
+            </a:r>
+            <a:r>
+              <a:rPr lang="en-US" sz="2200" dirty="0" smtClean="0">
+                <a:solidFill>
+                  <a:srgbClr val="5F5F5F"/>
+                </a:solidFill>
+              </a:rPr>
+              <a:t>using the </a:t>
+            </a:r>
+            <a:r>
+              <a:rPr lang="en-US" sz="2200" dirty="0">
+                <a:solidFill>
+                  <a:srgbClr val="5F5F5F"/>
+                </a:solidFill>
+              </a:rPr>
+              <a:t>average </a:t>
+            </a:r>
+            <a:r>
+              <a:rPr lang="en-US" sz="2200" dirty="0" smtClean="0">
+                <a:solidFill>
+                  <a:srgbClr val="5F5F5F"/>
+                </a:solidFill>
+              </a:rPr>
+              <a:t>response </a:t>
+            </a:r>
+            <a:r>
+              <a:rPr lang="en-US" sz="2200" dirty="0">
+                <a:solidFill>
+                  <a:srgbClr val="5F5F5F"/>
+                </a:solidFill>
+              </a:rPr>
+              <a:t>time of any request to the different </a:t>
+            </a:r>
+            <a:r>
+              <a:rPr lang="en-US" sz="2200" dirty="0" smtClean="0">
+                <a:solidFill>
+                  <a:srgbClr val="5F5F5F"/>
+                </a:solidFill>
+              </a:rPr>
+              <a:t>data-stores</a:t>
+            </a:r>
+            <a:endParaRPr lang="en-US" sz="2200" dirty="0" smtClean="0"/>
+          </a:p>
+          <a:p>
+            <a:pPr>
+              <a:lnSpc>
+                <a:spcPct val="150000"/>
+              </a:lnSpc>
+            </a:pPr>
+            <a:endParaRPr lang="fr-CH" sz="2200" dirty="0"/>
+          </a:p>
+        </p:txBody>
+      </p:sp>
+    </p:spTree>
+    <p:extLst>
+      <p:ext uri="{BB962C8B-B14F-4D97-AF65-F5344CB8AC3E}">
+        <p14:creationId xmlns:p14="http://schemas.microsoft.com/office/powerpoint/2010/main" val="2896604298"/>
+      </p:ext>
+    </p:extLst>
+  </p:cSld>
+  <p:clrMapOvr>
+    <a:masterClrMapping/>
+  </p:clrMapOvr>
+  <p:timing>
+    <p:tnLst>
+      <p:par>
+        <p:cTn id="1" dur="indefinite" restart="never" nodeType="tmRoot"/>
+      </p:par>
+    </p:tnLst>
+  </p:timing>
+</p:sld>
+</file>
+
+<file path=ppt/slides/slide5.xml><?xml version="1.0" encoding="utf-8"?>
+<p:sld xmlns:a="http://schemas.openxmlformats.org/drawingml/2006/main" xmlns:r="http://schemas.openxmlformats.org/officeDocument/2006/relationships" xmlns:p="http://schemas.openxmlformats.org/presentationml/2006/main">
+  <p:cSld>
+    <p:spTree>
+      <p:nvGrpSpPr>
+        <p:cNvPr id="1" name=""/>
+        <p:cNvGrpSpPr/>
+        <p:nvPr/>
+      </p:nvGrpSpPr>
+      <p:grpSpPr>
+        <a:xfrm>
+          <a:off x="0" y="0"/>
+          <a:ext cx="0" cy="0"/>
+          <a:chOff x="0" y="0"/>
+          <a:chExt cx="0" cy="0"/>
+        </a:xfrm>
+      </p:grpSpPr>
+      <p:sp>
+        <p:nvSpPr>
+          <p:cNvPr id="2" name="Titre 1"/>
+          <p:cNvSpPr txBox="1">
+            <a:spLocks/>
+          </p:cNvSpPr>
+          <p:nvPr/>
+        </p:nvSpPr>
+        <p:spPr>
+          <a:xfrm>
+            <a:off x="0" y="409131"/>
+            <a:ext cx="12192000" cy="605853"/>
+          </a:xfrm>
+          <a:prstGeom prst="rect">
+            <a:avLst/>
+          </a:prstGeom>
+        </p:spPr>
+        <p:txBody>
+          <a:bodyPr vert="horz" lIns="91440" tIns="45720" rIns="91440" bIns="45720" rtlCol="0" anchor="ctr">
+            <a:noAutofit/>
+          </a:bodyPr>
+          <a:lstStyle>
+            <a:lvl1pPr algn="l" defTabSz="914400" rtl="0" eaLnBrk="1" latinLnBrk="0" hangingPunct="1">
+              <a:lnSpc>
+                <a:spcPct val="90000"/>
+              </a:lnSpc>
+              <a:spcBef>
+                <a:spcPct val="0"/>
+              </a:spcBef>
+              <a:buNone/>
+              <a:defRPr sz="4400" kern="1200">
+                <a:solidFill>
+                  <a:schemeClr val="tx1"/>
+                </a:solidFill>
+                <a:latin typeface="+mj-lt"/>
+                <a:ea typeface="+mj-ea"/>
+                <a:cs typeface="+mj-cs"/>
+              </a:defRPr>
+            </a:lvl1pPr>
+          </a:lstStyle>
+          <a:p>
+            <a:pPr algn="ctr" eaLnBrk="0" fontAlgn="base" hangingPunct="0">
+              <a:spcAft>
+                <a:spcPct val="0"/>
+              </a:spcAft>
+            </a:pPr>
+            <a:r>
+              <a:rPr lang="fr-CH" altLang="en-US" sz="3600" b="1" dirty="0" err="1" smtClean="0">
+                <a:solidFill>
+                  <a:srgbClr val="0099CC"/>
+                </a:solidFill>
+                <a:latin typeface="+mn-lt"/>
+              </a:rPr>
+              <a:t>Factors</a:t>
+            </a:r>
+            <a:endParaRPr lang="fr-CH" altLang="en-US" sz="3600" b="1" dirty="0" smtClean="0">
+              <a:solidFill>
+                <a:srgbClr val="0099CC"/>
+              </a:solidFill>
+              <a:latin typeface="+mn-lt"/>
+            </a:endParaRPr>
+          </a:p>
+        </p:txBody>
+      </p:sp>
+      <p:sp>
+        <p:nvSpPr>
+          <p:cNvPr id="3" name="Sous-titre 2"/>
+          <p:cNvSpPr txBox="1">
+            <a:spLocks/>
+          </p:cNvSpPr>
+          <p:nvPr/>
+        </p:nvSpPr>
+        <p:spPr>
+          <a:xfrm>
+            <a:off x="777240" y="2065846"/>
+            <a:ext cx="10579608" cy="2881058"/>
+          </a:xfrm>
+          <a:prstGeom prst="rect">
+            <a:avLst/>
+          </a:prstGeom>
+        </p:spPr>
+        <p:txBody>
+          <a:bodyPr vert="horz" lIns="91440" tIns="45720" rIns="91440" bIns="45720" rtlCol="0">
+            <a:noAutofit/>
+          </a:bodyPr>
+          <a:lstStyle>
+            <a:lvl1pPr marL="228600" indent="-228600" algn="l" defTabSz="914400" rtl="0" eaLnBrk="1" latinLnBrk="0" hangingPunct="1">
+              <a:lnSpc>
+                <a:spcPct val="90000"/>
+              </a:lnSpc>
+              <a:spcBef>
+                <a:spcPts val="1000"/>
+              </a:spcBef>
+              <a:buFont typeface="Arial" panose="020B0604020202020204" pitchFamily="34" charset="0"/>
+              <a:buChar char="•"/>
+              <a:defRPr sz="2800" kern="1200">
+                <a:solidFill>
+                  <a:schemeClr val="tx1"/>
+                </a:solidFill>
+                <a:latin typeface="+mn-lt"/>
+                <a:ea typeface="+mn-ea"/>
+                <a:cs typeface="+mn-cs"/>
+              </a:defRPr>
+            </a:lvl1pPr>
+            <a:lvl2pPr marL="685800" indent="-228600" algn="l" defTabSz="914400" rtl="0" eaLnBrk="1" latinLnBrk="0" hangingPunct="1">
+              <a:lnSpc>
+                <a:spcPct val="90000"/>
+              </a:lnSpc>
+              <a:spcBef>
+                <a:spcPts val="500"/>
+              </a:spcBef>
+              <a:buFont typeface="Arial" panose="020B0604020202020204" pitchFamily="34" charset="0"/>
+              <a:buChar char="•"/>
+              <a:defRPr sz="2400" kern="1200">
+                <a:solidFill>
+                  <a:schemeClr val="tx1"/>
+                </a:solidFill>
+                <a:latin typeface="+mn-lt"/>
+                <a:ea typeface="+mn-ea"/>
+                <a:cs typeface="+mn-cs"/>
+              </a:defRPr>
+            </a:lvl2pPr>
+            <a:lvl3pPr marL="1143000" indent="-228600" algn="l" defTabSz="914400" rtl="0" eaLnBrk="1" latinLnBrk="0" hangingPunct="1">
+              <a:lnSpc>
+                <a:spcPct val="90000"/>
+              </a:lnSpc>
+              <a:spcBef>
+                <a:spcPts val="500"/>
+              </a:spcBef>
+              <a:buFont typeface="Arial" panose="020B0604020202020204" pitchFamily="34" charset="0"/>
+              <a:buChar char="•"/>
+              <a:defRPr sz="2000" kern="1200">
+                <a:solidFill>
+                  <a:schemeClr val="tx1"/>
+                </a:solidFill>
+                <a:latin typeface="+mn-lt"/>
+                <a:ea typeface="+mn-ea"/>
+                <a:cs typeface="+mn-cs"/>
+              </a:defRPr>
+            </a:lvl3pPr>
+            <a:lvl4pPr marL="1600200" indent="-228600" algn="l" defTabSz="914400" rtl="0" eaLnBrk="1" latinLnBrk="0" hangingPunct="1">
+              <a:lnSpc>
+                <a:spcPct val="90000"/>
+              </a:lnSpc>
+              <a:spcBef>
+                <a:spcPts val="500"/>
+              </a:spcBef>
+              <a:buFont typeface="Arial" panose="020B0604020202020204" pitchFamily="34" charset="0"/>
+              <a:buChar char="•"/>
+              <a:defRPr sz="1800" kern="1200">
+                <a:solidFill>
+                  <a:schemeClr val="tx1"/>
+                </a:solidFill>
+                <a:latin typeface="+mn-lt"/>
+                <a:ea typeface="+mn-ea"/>
+                <a:cs typeface="+mn-cs"/>
+              </a:defRPr>
+            </a:lvl4pPr>
+            <a:lvl5pPr marL="2057400" indent="-228600" algn="l" defTabSz="914400" rtl="0" eaLnBrk="1" latinLnBrk="0" hangingPunct="1">
+              <a:lnSpc>
+                <a:spcPct val="90000"/>
+              </a:lnSpc>
+              <a:spcBef>
+                <a:spcPts val="500"/>
+              </a:spcBef>
+              <a:buFont typeface="Arial" panose="020B0604020202020204" pitchFamily="34" charset="0"/>
+              <a:buChar char="•"/>
+              <a:defRPr sz="1800" kern="1200">
+                <a:solidFill>
+                  <a:schemeClr val="tx1"/>
+                </a:solidFill>
+                <a:latin typeface="+mn-lt"/>
+                <a:ea typeface="+mn-ea"/>
+                <a:cs typeface="+mn-cs"/>
+              </a:defRPr>
+            </a:lvl5pPr>
+            <a:lvl6pPr marL="2514600" indent="-228600" algn="l" defTabSz="914400" rtl="0" eaLnBrk="1" latinLnBrk="0" hangingPunct="1">
+              <a:lnSpc>
+                <a:spcPct val="90000"/>
+              </a:lnSpc>
+              <a:spcBef>
+                <a:spcPts val="500"/>
+              </a:spcBef>
+              <a:buFont typeface="Arial" panose="020B0604020202020204" pitchFamily="34" charset="0"/>
+              <a:buChar char="•"/>
+              <a:defRPr sz="1800" kern="1200">
+                <a:solidFill>
+                  <a:schemeClr val="tx1"/>
+                </a:solidFill>
+                <a:latin typeface="+mn-lt"/>
+                <a:ea typeface="+mn-ea"/>
+                <a:cs typeface="+mn-cs"/>
+              </a:defRPr>
+            </a:lvl6pPr>
+            <a:lvl7pPr marL="2971800" indent="-228600" algn="l" defTabSz="914400" rtl="0" eaLnBrk="1" latinLnBrk="0" hangingPunct="1">
+              <a:lnSpc>
+                <a:spcPct val="90000"/>
+              </a:lnSpc>
+              <a:spcBef>
+                <a:spcPts val="500"/>
+              </a:spcBef>
+              <a:buFont typeface="Arial" panose="020B0604020202020204" pitchFamily="34" charset="0"/>
+              <a:buChar char="•"/>
+              <a:defRPr sz="1800" kern="1200">
+                <a:solidFill>
+                  <a:schemeClr val="tx1"/>
+                </a:solidFill>
+                <a:latin typeface="+mn-lt"/>
+                <a:ea typeface="+mn-ea"/>
+                <a:cs typeface="+mn-cs"/>
+              </a:defRPr>
+            </a:lvl7pPr>
+            <a:lvl8pPr marL="3429000" indent="-228600" algn="l" defTabSz="914400" rtl="0" eaLnBrk="1" latinLnBrk="0" hangingPunct="1">
+              <a:lnSpc>
+                <a:spcPct val="90000"/>
+              </a:lnSpc>
+              <a:spcBef>
+                <a:spcPts val="500"/>
+              </a:spcBef>
+              <a:buFont typeface="Arial" panose="020B0604020202020204" pitchFamily="34" charset="0"/>
+              <a:buChar char="•"/>
+              <a:defRPr sz="1800" kern="1200">
+                <a:solidFill>
+                  <a:schemeClr val="tx1"/>
+                </a:solidFill>
+                <a:latin typeface="+mn-lt"/>
+                <a:ea typeface="+mn-ea"/>
+                <a:cs typeface="+mn-cs"/>
+              </a:defRPr>
+            </a:lvl8pPr>
+            <a:lvl9pPr marL="3886200" indent="-228600" algn="l" defTabSz="914400" rtl="0" eaLnBrk="1" latinLnBrk="0" hangingPunct="1">
+              <a:lnSpc>
+                <a:spcPct val="90000"/>
+              </a:lnSpc>
+              <a:spcBef>
+                <a:spcPts val="500"/>
+              </a:spcBef>
+              <a:buFont typeface="Arial" panose="020B0604020202020204" pitchFamily="34" charset="0"/>
+              <a:buChar char="•"/>
+              <a:defRPr sz="1800" kern="1200">
+                <a:solidFill>
+                  <a:schemeClr val="tx1"/>
+                </a:solidFill>
+                <a:latin typeface="+mn-lt"/>
+                <a:ea typeface="+mn-ea"/>
+                <a:cs typeface="+mn-cs"/>
+              </a:defRPr>
+            </a:lvl9pPr>
+          </a:lstStyle>
+          <a:p>
+            <a:pPr marL="342900" indent="-342900" eaLnBrk="0" fontAlgn="base" hangingPunct="0">
+              <a:lnSpc>
+                <a:spcPct val="150000"/>
+              </a:lnSpc>
+              <a:spcBef>
+                <a:spcPct val="20000"/>
+              </a:spcBef>
+              <a:spcAft>
+                <a:spcPct val="0"/>
+              </a:spcAft>
+              <a:buClr>
+                <a:schemeClr val="accent1"/>
+              </a:buClr>
+              <a:buBlip>
+                <a:blip r:embed="rId2"/>
+              </a:buBlip>
+            </a:pPr>
+            <a:r>
+              <a:rPr lang="en-US" sz="2200" dirty="0" smtClean="0">
+                <a:solidFill>
+                  <a:srgbClr val="5F5F5F"/>
+                </a:solidFill>
+              </a:rPr>
+              <a:t>For the first batch of results, mostly network factor. However, for the metric this should not be a problem since it will act on the results as a constant (if the load of the network does not vary a lot).</a:t>
+            </a:r>
+          </a:p>
+          <a:p>
+            <a:pPr marL="342900" indent="-342900" eaLnBrk="0" fontAlgn="base" hangingPunct="0">
+              <a:lnSpc>
+                <a:spcPct val="150000"/>
+              </a:lnSpc>
+              <a:spcBef>
+                <a:spcPct val="20000"/>
+              </a:spcBef>
+              <a:spcAft>
+                <a:spcPct val="0"/>
+              </a:spcAft>
+              <a:buClr>
+                <a:schemeClr val="accent1"/>
+              </a:buClr>
+              <a:buBlip>
+                <a:blip r:embed="rId2"/>
+              </a:buBlip>
+            </a:pPr>
+            <a:endParaRPr lang="en-US" sz="2200" dirty="0">
+              <a:solidFill>
+                <a:srgbClr val="5F5F5F"/>
+              </a:solidFill>
+            </a:endParaRPr>
+          </a:p>
+          <a:p>
+            <a:pPr marL="342900" indent="-342900" eaLnBrk="0" fontAlgn="base" hangingPunct="0">
+              <a:lnSpc>
+                <a:spcPct val="150000"/>
+              </a:lnSpc>
+              <a:spcBef>
+                <a:spcPct val="20000"/>
+              </a:spcBef>
+              <a:spcAft>
+                <a:spcPct val="0"/>
+              </a:spcAft>
+              <a:buClr>
+                <a:schemeClr val="accent1"/>
+              </a:buClr>
+              <a:buBlip>
+                <a:blip r:embed="rId2"/>
+              </a:buBlip>
+            </a:pPr>
+            <a:r>
+              <a:rPr lang="en-US" sz="2200" dirty="0" smtClean="0">
+                <a:solidFill>
+                  <a:srgbClr val="5F5F5F"/>
+                </a:solidFill>
+              </a:rPr>
+              <a:t>For the second batch of results, network factor will probably be negligible since the load will be generated in a closed network containing only two machines (i.e. the server and the clients)</a:t>
+            </a:r>
+            <a:endParaRPr lang="en-US" sz="2200" dirty="0" smtClean="0"/>
+          </a:p>
+          <a:p>
+            <a:pPr>
+              <a:lnSpc>
+                <a:spcPct val="150000"/>
+              </a:lnSpc>
+            </a:pPr>
+            <a:endParaRPr lang="fr-CH" sz="2200" dirty="0"/>
+          </a:p>
+        </p:txBody>
+      </p:sp>
+    </p:spTree>
+    <p:extLst>
+      <p:ext uri="{BB962C8B-B14F-4D97-AF65-F5344CB8AC3E}">
+        <p14:creationId xmlns:p14="http://schemas.microsoft.com/office/powerpoint/2010/main" val="3110927324"/>
+      </p:ext>
+    </p:extLst>
+  </p:cSld>
+  <p:clrMapOvr>
+    <a:masterClrMapping/>
+  </p:clrMapOvr>
+  <p:timing>
+    <p:tnLst>
+      <p:par>
+        <p:cTn id="1" dur="indefinite" restart="never" nodeType="tmRoot"/>
+      </p:par>
+    </p:tnLst>
+  </p:timing>
+</p:sld>
+</file>
+
+<file path=ppt/slides/slide6.xml><?xml version="1.0" encoding="utf-8"?>
+<p:sld xmlns:a="http://schemas.openxmlformats.org/drawingml/2006/main" xmlns:r="http://schemas.openxmlformats.org/officeDocument/2006/relationships" xmlns:p="http://schemas.openxmlformats.org/presentationml/2006/main">
+  <p:cSld>
+    <p:spTree>
+      <p:nvGrpSpPr>
+        <p:cNvPr id="1" name=""/>
+        <p:cNvGrpSpPr/>
+        <p:nvPr/>
+      </p:nvGrpSpPr>
+      <p:grpSpPr>
+        <a:xfrm>
+          <a:off x="0" y="0"/>
+          <a:ext cx="0" cy="0"/>
+          <a:chOff x="0" y="0"/>
+          <a:chExt cx="0" cy="0"/>
+        </a:xfrm>
+      </p:grpSpPr>
+      <p:sp>
+        <p:nvSpPr>
+          <p:cNvPr id="2" name="Titre 1"/>
+          <p:cNvSpPr txBox="1">
+            <a:spLocks/>
+          </p:cNvSpPr>
+          <p:nvPr/>
+        </p:nvSpPr>
+        <p:spPr>
+          <a:xfrm>
+            <a:off x="0" y="409131"/>
+            <a:ext cx="12192000" cy="605853"/>
+          </a:xfrm>
+          <a:prstGeom prst="rect">
+            <a:avLst/>
+          </a:prstGeom>
+        </p:spPr>
+        <p:txBody>
+          <a:bodyPr vert="horz" lIns="91440" tIns="45720" rIns="91440" bIns="45720" rtlCol="0" anchor="ctr">
+            <a:noAutofit/>
+          </a:bodyPr>
+          <a:lstStyle>
+            <a:lvl1pPr algn="l" defTabSz="914400" rtl="0" eaLnBrk="1" latinLnBrk="0" hangingPunct="1">
+              <a:lnSpc>
+                <a:spcPct val="90000"/>
+              </a:lnSpc>
+              <a:spcBef>
+                <a:spcPct val="0"/>
+              </a:spcBef>
+              <a:buNone/>
+              <a:defRPr sz="4400" kern="1200">
+                <a:solidFill>
+                  <a:schemeClr val="tx1"/>
+                </a:solidFill>
+                <a:latin typeface="+mj-lt"/>
+                <a:ea typeface="+mj-ea"/>
+                <a:cs typeface="+mj-cs"/>
+              </a:defRPr>
+            </a:lvl1pPr>
+          </a:lstStyle>
+          <a:p>
+            <a:pPr algn="ctr" eaLnBrk="0" fontAlgn="base" hangingPunct="0">
+              <a:spcAft>
+                <a:spcPct val="0"/>
+              </a:spcAft>
+            </a:pPr>
+            <a:r>
+              <a:rPr lang="fr-CH" altLang="en-US" sz="3600" b="1" dirty="0" smtClean="0">
+                <a:solidFill>
+                  <a:srgbClr val="0099CC"/>
+                </a:solidFill>
+                <a:latin typeface="+mn-lt"/>
+              </a:rPr>
+              <a:t>Method</a:t>
+            </a:r>
+          </a:p>
+        </p:txBody>
+      </p:sp>
+      <p:sp>
+        <p:nvSpPr>
+          <p:cNvPr id="3" name="Sous-titre 2"/>
+          <p:cNvSpPr txBox="1">
+            <a:spLocks/>
+          </p:cNvSpPr>
+          <p:nvPr/>
+        </p:nvSpPr>
+        <p:spPr>
+          <a:xfrm>
+            <a:off x="777240" y="2065846"/>
+            <a:ext cx="10579608" cy="2881058"/>
+          </a:xfrm>
+          <a:prstGeom prst="rect">
+            <a:avLst/>
+          </a:prstGeom>
+        </p:spPr>
+        <p:txBody>
+          <a:bodyPr vert="horz" lIns="91440" tIns="45720" rIns="91440" bIns="45720" rtlCol="0">
+            <a:noAutofit/>
+          </a:bodyPr>
+          <a:lstStyle>
+            <a:lvl1pPr marL="228600" indent="-228600" algn="l" defTabSz="914400" rtl="0" eaLnBrk="1" latinLnBrk="0" hangingPunct="1">
+              <a:lnSpc>
+                <a:spcPct val="90000"/>
+              </a:lnSpc>
+              <a:spcBef>
+                <a:spcPts val="1000"/>
+              </a:spcBef>
+              <a:buFont typeface="Arial" panose="020B0604020202020204" pitchFamily="34" charset="0"/>
+              <a:buChar char="•"/>
+              <a:defRPr sz="2800" kern="1200">
+                <a:solidFill>
+                  <a:schemeClr val="tx1"/>
+                </a:solidFill>
+                <a:latin typeface="+mn-lt"/>
+                <a:ea typeface="+mn-ea"/>
+                <a:cs typeface="+mn-cs"/>
+              </a:defRPr>
+            </a:lvl1pPr>
+            <a:lvl2pPr marL="685800" indent="-228600" algn="l" defTabSz="914400" rtl="0" eaLnBrk="1" latinLnBrk="0" hangingPunct="1">
+              <a:lnSpc>
+                <a:spcPct val="90000"/>
+              </a:lnSpc>
+              <a:spcBef>
+                <a:spcPts val="500"/>
+              </a:spcBef>
+              <a:buFont typeface="Arial" panose="020B0604020202020204" pitchFamily="34" charset="0"/>
+              <a:buChar char="•"/>
+              <a:defRPr sz="2400" kern="1200">
+                <a:solidFill>
+                  <a:schemeClr val="tx1"/>
+                </a:solidFill>
+                <a:latin typeface="+mn-lt"/>
+                <a:ea typeface="+mn-ea"/>
+                <a:cs typeface="+mn-cs"/>
+              </a:defRPr>
+            </a:lvl2pPr>
+            <a:lvl3pPr marL="1143000" indent="-228600" algn="l" defTabSz="914400" rtl="0" eaLnBrk="1" latinLnBrk="0" hangingPunct="1">
+              <a:lnSpc>
+                <a:spcPct val="90000"/>
+              </a:lnSpc>
+              <a:spcBef>
+                <a:spcPts val="500"/>
+              </a:spcBef>
+              <a:buFont typeface="Arial" panose="020B0604020202020204" pitchFamily="34" charset="0"/>
+              <a:buChar char="•"/>
+              <a:defRPr sz="2000" kern="1200">
+                <a:solidFill>
+                  <a:schemeClr val="tx1"/>
+                </a:solidFill>
+                <a:latin typeface="+mn-lt"/>
+                <a:ea typeface="+mn-ea"/>
+                <a:cs typeface="+mn-cs"/>
+              </a:defRPr>
+            </a:lvl3pPr>
+            <a:lvl4pPr marL="1600200" indent="-228600" algn="l" defTabSz="914400" rtl="0" eaLnBrk="1" latinLnBrk="0" hangingPunct="1">
+              <a:lnSpc>
+                <a:spcPct val="90000"/>
+              </a:lnSpc>
+              <a:spcBef>
+                <a:spcPts val="500"/>
+              </a:spcBef>
+              <a:buFont typeface="Arial" panose="020B0604020202020204" pitchFamily="34" charset="0"/>
+              <a:buChar char="•"/>
+              <a:defRPr sz="1800" kern="1200">
+                <a:solidFill>
+                  <a:schemeClr val="tx1"/>
+                </a:solidFill>
+                <a:latin typeface="+mn-lt"/>
+                <a:ea typeface="+mn-ea"/>
+                <a:cs typeface="+mn-cs"/>
+              </a:defRPr>
+            </a:lvl4pPr>
+            <a:lvl5pPr marL="2057400" indent="-228600" algn="l" defTabSz="914400" rtl="0" eaLnBrk="1" latinLnBrk="0" hangingPunct="1">
+              <a:lnSpc>
+                <a:spcPct val="90000"/>
+              </a:lnSpc>
+              <a:spcBef>
+                <a:spcPts val="500"/>
+              </a:spcBef>
+              <a:buFont typeface="Arial" panose="020B0604020202020204" pitchFamily="34" charset="0"/>
+              <a:buChar char="•"/>
+              <a:defRPr sz="1800" kern="1200">
+                <a:solidFill>
+                  <a:schemeClr val="tx1"/>
+                </a:solidFill>
+                <a:latin typeface="+mn-lt"/>
+                <a:ea typeface="+mn-ea"/>
+                <a:cs typeface="+mn-cs"/>
+              </a:defRPr>
+            </a:lvl5pPr>
+            <a:lvl6pPr marL="2514600" indent="-228600" algn="l" defTabSz="914400" rtl="0" eaLnBrk="1" latinLnBrk="0" hangingPunct="1">
+              <a:lnSpc>
+                <a:spcPct val="90000"/>
+              </a:lnSpc>
+              <a:spcBef>
+                <a:spcPts val="500"/>
+              </a:spcBef>
+              <a:buFont typeface="Arial" panose="020B0604020202020204" pitchFamily="34" charset="0"/>
+              <a:buChar char="•"/>
+              <a:defRPr sz="1800" kern="1200">
+                <a:solidFill>
+                  <a:schemeClr val="tx1"/>
+                </a:solidFill>
+                <a:latin typeface="+mn-lt"/>
+                <a:ea typeface="+mn-ea"/>
+                <a:cs typeface="+mn-cs"/>
+              </a:defRPr>
+            </a:lvl6pPr>
+            <a:lvl7pPr marL="2971800" indent="-228600" algn="l" defTabSz="914400" rtl="0" eaLnBrk="1" latinLnBrk="0" hangingPunct="1">
+              <a:lnSpc>
+                <a:spcPct val="90000"/>
+              </a:lnSpc>
+              <a:spcBef>
+                <a:spcPts val="500"/>
+              </a:spcBef>
+              <a:buFont typeface="Arial" panose="020B0604020202020204" pitchFamily="34" charset="0"/>
+              <a:buChar char="•"/>
+              <a:defRPr sz="1800" kern="1200">
+                <a:solidFill>
+                  <a:schemeClr val="tx1"/>
+                </a:solidFill>
+                <a:latin typeface="+mn-lt"/>
+                <a:ea typeface="+mn-ea"/>
+                <a:cs typeface="+mn-cs"/>
+              </a:defRPr>
+            </a:lvl7pPr>
+            <a:lvl8pPr marL="3429000" indent="-228600" algn="l" defTabSz="914400" rtl="0" eaLnBrk="1" latinLnBrk="0" hangingPunct="1">
+              <a:lnSpc>
+                <a:spcPct val="90000"/>
+              </a:lnSpc>
+              <a:spcBef>
+                <a:spcPts val="500"/>
+              </a:spcBef>
+              <a:buFont typeface="Arial" panose="020B0604020202020204" pitchFamily="34" charset="0"/>
+              <a:buChar char="•"/>
+              <a:defRPr sz="1800" kern="1200">
+                <a:solidFill>
+                  <a:schemeClr val="tx1"/>
+                </a:solidFill>
+                <a:latin typeface="+mn-lt"/>
+                <a:ea typeface="+mn-ea"/>
+                <a:cs typeface="+mn-cs"/>
+              </a:defRPr>
+            </a:lvl8pPr>
+            <a:lvl9pPr marL="3886200" indent="-228600" algn="l" defTabSz="914400" rtl="0" eaLnBrk="1" latinLnBrk="0" hangingPunct="1">
+              <a:lnSpc>
+                <a:spcPct val="90000"/>
+              </a:lnSpc>
+              <a:spcBef>
+                <a:spcPts val="500"/>
+              </a:spcBef>
+              <a:buFont typeface="Arial" panose="020B0604020202020204" pitchFamily="34" charset="0"/>
+              <a:buChar char="•"/>
+              <a:defRPr sz="1800" kern="1200">
+                <a:solidFill>
+                  <a:schemeClr val="tx1"/>
+                </a:solidFill>
+                <a:latin typeface="+mn-lt"/>
+                <a:ea typeface="+mn-ea"/>
+                <a:cs typeface="+mn-cs"/>
+              </a:defRPr>
+            </a:lvl9pPr>
+          </a:lstStyle>
+          <a:p>
+            <a:pPr marL="342900" indent="-342900" eaLnBrk="0" fontAlgn="base" hangingPunct="0">
+              <a:lnSpc>
+                <a:spcPct val="150000"/>
+              </a:lnSpc>
+              <a:spcBef>
+                <a:spcPct val="20000"/>
+              </a:spcBef>
+              <a:spcAft>
+                <a:spcPct val="0"/>
+              </a:spcAft>
+              <a:buClr>
+                <a:schemeClr val="accent1"/>
+              </a:buClr>
+              <a:buBlip>
+                <a:blip r:embed="rId2"/>
+              </a:buBlip>
+            </a:pPr>
+            <a:r>
+              <a:rPr lang="en-US" sz="2200" dirty="0" smtClean="0">
+                <a:solidFill>
+                  <a:srgbClr val="5F5F5F"/>
+                </a:solidFill>
+              </a:rPr>
+              <a:t>As previously mentioned, running benchmarks to evaluate the average waiting time for an answer coming from the data-store.</a:t>
+            </a:r>
+            <a:endParaRPr lang="en-US" sz="2200" dirty="0" smtClean="0"/>
+          </a:p>
+          <a:p>
+            <a:pPr>
+              <a:lnSpc>
+                <a:spcPct val="150000"/>
+              </a:lnSpc>
+            </a:pPr>
+            <a:endParaRPr lang="fr-CH" sz="2200" dirty="0"/>
+          </a:p>
+        </p:txBody>
+      </p:sp>
+    </p:spTree>
+    <p:extLst>
+      <p:ext uri="{BB962C8B-B14F-4D97-AF65-F5344CB8AC3E}">
+        <p14:creationId xmlns:p14="http://schemas.microsoft.com/office/powerpoint/2010/main" val="3322908131"/>
+      </p:ext>
+    </p:extLst>
+  </p:cSld>
+  <p:clrMapOvr>
+    <a:masterClrMapping/>
+  </p:clrMapOvr>
+  <p:timing>
+    <p:tnLst>
+      <p:par>
+        <p:cTn id="1" dur="indefinite" restart="never" nodeType="tmRoot"/>
+      </p:par>
+    </p:tnLst>
+  </p:timing>
+</p:sld>
+</file>
+
+<file path=ppt/slides/slide7.xml><?xml version="1.0" encoding="utf-8"?>
+<p:sld xmlns:a="http://schemas.openxmlformats.org/drawingml/2006/main" xmlns:r="http://schemas.openxmlformats.org/officeDocument/2006/relationships" xmlns:p="http://schemas.openxmlformats.org/presentationml/2006/main">
+  <p:cSld>
+    <p:spTree>
+      <p:nvGrpSpPr>
+        <p:cNvPr id="1" name=""/>
+        <p:cNvGrpSpPr/>
+        <p:nvPr/>
+      </p:nvGrpSpPr>
+      <p:grpSpPr>
+        <a:xfrm>
+          <a:off x="0" y="0"/>
+          <a:ext cx="0" cy="0"/>
+          <a:chOff x="0" y="0"/>
+          <a:chExt cx="0" cy="0"/>
+        </a:xfrm>
+      </p:grpSpPr>
+      <p:sp>
+        <p:nvSpPr>
+          <p:cNvPr id="2" name="Titre 1"/>
+          <p:cNvSpPr txBox="1">
+            <a:spLocks/>
+          </p:cNvSpPr>
+          <p:nvPr/>
+        </p:nvSpPr>
+        <p:spPr>
+          <a:xfrm>
+            <a:off x="0" y="409131"/>
+            <a:ext cx="12192000" cy="605853"/>
+          </a:xfrm>
+          <a:prstGeom prst="rect">
+            <a:avLst/>
+          </a:prstGeom>
+        </p:spPr>
+        <p:txBody>
+          <a:bodyPr vert="horz" lIns="91440" tIns="45720" rIns="91440" bIns="45720" rtlCol="0" anchor="ctr">
+            <a:noAutofit/>
+          </a:bodyPr>
+          <a:lstStyle>
+            <a:lvl1pPr algn="l" defTabSz="914400" rtl="0" eaLnBrk="1" latinLnBrk="0" hangingPunct="1">
+              <a:lnSpc>
+                <a:spcPct val="90000"/>
+              </a:lnSpc>
+              <a:spcBef>
+                <a:spcPct val="0"/>
+              </a:spcBef>
+              <a:buNone/>
+              <a:defRPr sz="4400" kern="1200">
+                <a:solidFill>
+                  <a:schemeClr val="tx1"/>
+                </a:solidFill>
+                <a:latin typeface="+mj-lt"/>
+                <a:ea typeface="+mj-ea"/>
+                <a:cs typeface="+mj-cs"/>
+              </a:defRPr>
+            </a:lvl1pPr>
+          </a:lstStyle>
+          <a:p>
+            <a:pPr algn="ctr" eaLnBrk="0" fontAlgn="base" hangingPunct="0">
+              <a:spcAft>
+                <a:spcPct val="0"/>
+              </a:spcAft>
+            </a:pPr>
+            <a:r>
+              <a:rPr lang="fr-CH" altLang="en-US" sz="3600" b="1" dirty="0" err="1" smtClean="0">
+                <a:solidFill>
+                  <a:srgbClr val="0099CC"/>
+                </a:solidFill>
+                <a:latin typeface="+mn-lt"/>
+              </a:rPr>
+              <a:t>Experiments</a:t>
+            </a:r>
+            <a:endParaRPr lang="fr-CH" altLang="en-US" sz="3600" b="1" dirty="0" smtClean="0">
+              <a:solidFill>
+                <a:srgbClr val="0099CC"/>
+              </a:solidFill>
+              <a:latin typeface="+mn-lt"/>
+            </a:endParaRPr>
+          </a:p>
+        </p:txBody>
+      </p:sp>
+      <p:sp>
+        <p:nvSpPr>
+          <p:cNvPr id="3" name="Sous-titre 2"/>
+          <p:cNvSpPr txBox="1">
+            <a:spLocks/>
+          </p:cNvSpPr>
+          <p:nvPr/>
+        </p:nvSpPr>
+        <p:spPr>
+          <a:xfrm>
+            <a:off x="777240" y="2065846"/>
+            <a:ext cx="10579608" cy="2881058"/>
+          </a:xfrm>
+          <a:prstGeom prst="rect">
+            <a:avLst/>
+          </a:prstGeom>
+        </p:spPr>
+        <p:txBody>
+          <a:bodyPr vert="horz" lIns="91440" tIns="45720" rIns="91440" bIns="45720" rtlCol="0">
+            <a:noAutofit/>
+          </a:bodyPr>
+          <a:lstStyle>
+            <a:lvl1pPr marL="228600" indent="-228600" algn="l" defTabSz="914400" rtl="0" eaLnBrk="1" latinLnBrk="0" hangingPunct="1">
+              <a:lnSpc>
+                <a:spcPct val="90000"/>
+              </a:lnSpc>
+              <a:spcBef>
+                <a:spcPts val="1000"/>
+              </a:spcBef>
+              <a:buFont typeface="Arial" panose="020B0604020202020204" pitchFamily="34" charset="0"/>
+              <a:buChar char="•"/>
+              <a:defRPr sz="2800" kern="1200">
+                <a:solidFill>
+                  <a:schemeClr val="tx1"/>
+                </a:solidFill>
+                <a:latin typeface="+mn-lt"/>
+                <a:ea typeface="+mn-ea"/>
+                <a:cs typeface="+mn-cs"/>
+              </a:defRPr>
+            </a:lvl1pPr>
+            <a:lvl2pPr marL="685800" indent="-228600" algn="l" defTabSz="914400" rtl="0" eaLnBrk="1" latinLnBrk="0" hangingPunct="1">
+              <a:lnSpc>
+                <a:spcPct val="90000"/>
+              </a:lnSpc>
+              <a:spcBef>
+                <a:spcPts val="500"/>
+              </a:spcBef>
+              <a:buFont typeface="Arial" panose="020B0604020202020204" pitchFamily="34" charset="0"/>
+              <a:buChar char="•"/>
+              <a:defRPr sz="2400" kern="1200">
+                <a:solidFill>
+                  <a:schemeClr val="tx1"/>
+                </a:solidFill>
+                <a:latin typeface="+mn-lt"/>
+                <a:ea typeface="+mn-ea"/>
+                <a:cs typeface="+mn-cs"/>
+              </a:defRPr>
+            </a:lvl2pPr>
+            <a:lvl3pPr marL="1143000" indent="-228600" algn="l" defTabSz="914400" rtl="0" eaLnBrk="1" latinLnBrk="0" hangingPunct="1">
+              <a:lnSpc>
+                <a:spcPct val="90000"/>
+              </a:lnSpc>
+              <a:spcBef>
+                <a:spcPts val="500"/>
+              </a:spcBef>
+              <a:buFont typeface="Arial" panose="020B0604020202020204" pitchFamily="34" charset="0"/>
+              <a:buChar char="•"/>
+              <a:defRPr sz="2000" kern="1200">
+                <a:solidFill>
+                  <a:schemeClr val="tx1"/>
+                </a:solidFill>
+                <a:latin typeface="+mn-lt"/>
+                <a:ea typeface="+mn-ea"/>
+                <a:cs typeface="+mn-cs"/>
+              </a:defRPr>
+            </a:lvl3pPr>
+            <a:lvl4pPr marL="1600200" indent="-228600" algn="l" defTabSz="914400" rtl="0" eaLnBrk="1" latinLnBrk="0" hangingPunct="1">
+              <a:lnSpc>
+                <a:spcPct val="90000"/>
+              </a:lnSpc>
+              <a:spcBef>
+                <a:spcPts val="500"/>
+              </a:spcBef>
+              <a:buFont typeface="Arial" panose="020B0604020202020204" pitchFamily="34" charset="0"/>
+              <a:buChar char="•"/>
+              <a:defRPr sz="1800" kern="1200">
+                <a:solidFill>
+                  <a:schemeClr val="tx1"/>
+                </a:solidFill>
+                <a:latin typeface="+mn-lt"/>
+                <a:ea typeface="+mn-ea"/>
+                <a:cs typeface="+mn-cs"/>
+              </a:defRPr>
+            </a:lvl4pPr>
+            <a:lvl5pPr marL="2057400" indent="-228600" algn="l" defTabSz="914400" rtl="0" eaLnBrk="1" latinLnBrk="0" hangingPunct="1">
+              <a:lnSpc>
+                <a:spcPct val="90000"/>
+              </a:lnSpc>
+              <a:spcBef>
+                <a:spcPts val="500"/>
+              </a:spcBef>
+              <a:buFont typeface="Arial" panose="020B0604020202020204" pitchFamily="34" charset="0"/>
+              <a:buChar char="•"/>
+              <a:defRPr sz="1800" kern="1200">
+                <a:solidFill>
+                  <a:schemeClr val="tx1"/>
+                </a:solidFill>
+                <a:latin typeface="+mn-lt"/>
+                <a:ea typeface="+mn-ea"/>
+                <a:cs typeface="+mn-cs"/>
+              </a:defRPr>
+            </a:lvl5pPr>
+            <a:lvl6pPr marL="2514600" indent="-228600" algn="l" defTabSz="914400" rtl="0" eaLnBrk="1" latinLnBrk="0" hangingPunct="1">
+              <a:lnSpc>
+                <a:spcPct val="90000"/>
+              </a:lnSpc>
+              <a:spcBef>
+                <a:spcPts val="500"/>
+              </a:spcBef>
+              <a:buFont typeface="Arial" panose="020B0604020202020204" pitchFamily="34" charset="0"/>
+              <a:buChar char="•"/>
+              <a:defRPr sz="1800" kern="1200">
+                <a:solidFill>
+                  <a:schemeClr val="tx1"/>
+                </a:solidFill>
+                <a:latin typeface="+mn-lt"/>
+                <a:ea typeface="+mn-ea"/>
+                <a:cs typeface="+mn-cs"/>
+              </a:defRPr>
+            </a:lvl6pPr>
+            <a:lvl7pPr marL="2971800" indent="-228600" algn="l" defTabSz="914400" rtl="0" eaLnBrk="1" latinLnBrk="0" hangingPunct="1">
+              <a:lnSpc>
+                <a:spcPct val="90000"/>
+              </a:lnSpc>
+              <a:spcBef>
+                <a:spcPts val="500"/>
+              </a:spcBef>
+              <a:buFont typeface="Arial" panose="020B0604020202020204" pitchFamily="34" charset="0"/>
+              <a:buChar char="•"/>
+              <a:defRPr sz="1800" kern="1200">
+                <a:solidFill>
+                  <a:schemeClr val="tx1"/>
+                </a:solidFill>
+                <a:latin typeface="+mn-lt"/>
+                <a:ea typeface="+mn-ea"/>
+                <a:cs typeface="+mn-cs"/>
+              </a:defRPr>
+            </a:lvl7pPr>
+            <a:lvl8pPr marL="3429000" indent="-228600" algn="l" defTabSz="914400" rtl="0" eaLnBrk="1" latinLnBrk="0" hangingPunct="1">
+              <a:lnSpc>
+                <a:spcPct val="90000"/>
+              </a:lnSpc>
+              <a:spcBef>
+                <a:spcPts val="500"/>
+              </a:spcBef>
+              <a:buFont typeface="Arial" panose="020B0604020202020204" pitchFamily="34" charset="0"/>
+              <a:buChar char="•"/>
+              <a:defRPr sz="1800" kern="1200">
+                <a:solidFill>
+                  <a:schemeClr val="tx1"/>
+                </a:solidFill>
+                <a:latin typeface="+mn-lt"/>
+                <a:ea typeface="+mn-ea"/>
+                <a:cs typeface="+mn-cs"/>
+              </a:defRPr>
+            </a:lvl8pPr>
+            <a:lvl9pPr marL="3886200" indent="-228600" algn="l" defTabSz="914400" rtl="0" eaLnBrk="1" latinLnBrk="0" hangingPunct="1">
+              <a:lnSpc>
+                <a:spcPct val="90000"/>
+              </a:lnSpc>
+              <a:spcBef>
+                <a:spcPts val="500"/>
+              </a:spcBef>
+              <a:buFont typeface="Arial" panose="020B0604020202020204" pitchFamily="34" charset="0"/>
+              <a:buChar char="•"/>
+              <a:defRPr sz="1800" kern="1200">
+                <a:solidFill>
+                  <a:schemeClr val="tx1"/>
+                </a:solidFill>
+                <a:latin typeface="+mn-lt"/>
+                <a:ea typeface="+mn-ea"/>
+                <a:cs typeface="+mn-cs"/>
+              </a:defRPr>
+            </a:lvl9pPr>
+          </a:lstStyle>
+          <a:p>
+            <a:pPr marL="342900" indent="-342900" eaLnBrk="0" fontAlgn="base" hangingPunct="0">
+              <a:lnSpc>
+                <a:spcPct val="150000"/>
+              </a:lnSpc>
+              <a:spcBef>
+                <a:spcPct val="20000"/>
+              </a:spcBef>
+              <a:spcAft>
+                <a:spcPct val="0"/>
+              </a:spcAft>
+              <a:buClr>
+                <a:schemeClr val="accent1"/>
+              </a:buClr>
+              <a:buBlip>
+                <a:blip r:embed="rId2"/>
+              </a:buBlip>
+            </a:pPr>
+            <a:r>
+              <a:rPr lang="en-US" sz="2200" dirty="0" smtClean="0">
+                <a:solidFill>
+                  <a:srgbClr val="5F5F5F"/>
+                </a:solidFill>
+              </a:rPr>
+              <a:t>For now, only a growing experiment has been done. For each client, hundred get/set requests over hundred predefined keys. Number of parallel clients accessing the server grows from 1 to 500. </a:t>
+            </a:r>
+            <a:r>
+              <a:rPr lang="en-US" sz="2200" smtClean="0">
+                <a:solidFill>
+                  <a:srgbClr val="5F5F5F"/>
+                </a:solidFill>
+              </a:rPr>
+              <a:t>Every data-store has </a:t>
+            </a:r>
+            <a:r>
+              <a:rPr lang="en-US" sz="2200" dirty="0" smtClean="0">
+                <a:solidFill>
+                  <a:srgbClr val="5F5F5F"/>
+                </a:solidFill>
+              </a:rPr>
+              <a:t>been tested.</a:t>
+            </a:r>
+          </a:p>
+          <a:p>
+            <a:pPr marL="342900" indent="-342900" eaLnBrk="0" fontAlgn="base" hangingPunct="0">
+              <a:lnSpc>
+                <a:spcPct val="150000"/>
+              </a:lnSpc>
+              <a:spcBef>
+                <a:spcPct val="20000"/>
+              </a:spcBef>
+              <a:spcAft>
+                <a:spcPct val="0"/>
+              </a:spcAft>
+              <a:buClr>
+                <a:schemeClr val="accent1"/>
+              </a:buClr>
+              <a:buBlip>
+                <a:blip r:embed="rId2"/>
+              </a:buBlip>
+            </a:pPr>
+            <a:r>
+              <a:rPr lang="en-US" sz="2200" dirty="0" smtClean="0">
+                <a:solidFill>
+                  <a:srgbClr val="5F5F5F"/>
+                </a:solidFill>
+              </a:rPr>
+              <a:t>Next experiment will be to have confidence intervals for fixed number of clients.</a:t>
+            </a:r>
+            <a:endParaRPr lang="en-US" sz="2200" dirty="0" smtClean="0"/>
+          </a:p>
+          <a:p>
+            <a:pPr>
+              <a:lnSpc>
+                <a:spcPct val="150000"/>
+              </a:lnSpc>
+            </a:pPr>
+            <a:endParaRPr lang="fr-CH" sz="2200" dirty="0"/>
+          </a:p>
+        </p:txBody>
+      </p:sp>
+    </p:spTree>
+    <p:extLst>
+      <p:ext uri="{BB962C8B-B14F-4D97-AF65-F5344CB8AC3E}">
+        <p14:creationId xmlns:p14="http://schemas.microsoft.com/office/powerpoint/2010/main" val="233065979"/>
+      </p:ext>
+    </p:extLst>
+  </p:cSld>
+  <p:clrMapOvr>
+    <a:masterClrMapping/>
+  </p:clrMapOvr>
+  <p:timing>
+    <p:tnLst>
+      <p:par>
+        <p:cTn id="1" dur="indefinite" restart="never" nodeType="tmRoot"/>
+      </p:par>
+    </p:tnLst>
+  </p:timing>
+</p:sld>
+</file>
+
+<file path=ppt/slides/slide8.xml><?xml version="1.0" encoding="utf-8"?>
+<p:sld xmlns:a="http://schemas.openxmlformats.org/drawingml/2006/main" xmlns:r="http://schemas.openxmlformats.org/officeDocument/2006/relationships" xmlns:p="http://schemas.openxmlformats.org/presentationml/2006/main">
+  <p:cSld>
+    <p:spTree>
+      <p:nvGrpSpPr>
+        <p:cNvPr id="1" name=""/>
+        <p:cNvGrpSpPr/>
+        <p:nvPr/>
+      </p:nvGrpSpPr>
+      <p:grpSpPr>
+        <a:xfrm>
+          <a:off x="0" y="0"/>
+          <a:ext cx="0" cy="0"/>
+          <a:chOff x="0" y="0"/>
+          <a:chExt cx="0" cy="0"/>
+        </a:xfrm>
+      </p:grpSpPr>
+      <p:pic>
+        <p:nvPicPr>
+          <p:cNvPr id="7" name="Image 6"/>
+          <p:cNvPicPr>
+            <a:picLocks noChangeAspect="1"/>
+          </p:cNvPicPr>
+          <p:nvPr/>
+        </p:nvPicPr>
+        <p:blipFill>
+          <a:blip r:embed="rId2" cstate="print">
+            <a:extLst>
+              <a:ext uri="{28A0092B-C50C-407E-A947-70E740481C1C}">
+                <a14:useLocalDpi xmlns:a14="http://schemas.microsoft.com/office/drawing/2010/main" val="0"/>
+              </a:ext>
+            </a:extLst>
+          </a:blip>
+          <a:stretch>
+            <a:fillRect/>
+          </a:stretch>
+        </p:blipFill>
+        <p:spPr>
+          <a:xfrm>
+            <a:off x="5303520" y="1014983"/>
+            <a:ext cx="6888481" cy="5369631"/>
+          </a:xfrm>
+          <a:prstGeom prst="rect">
+            <a:avLst/>
+          </a:prstGeom>
+        </p:spPr>
+      </p:pic>
+      <p:sp>
+        <p:nvSpPr>
+          <p:cNvPr id="2" name="Titre 1"/>
+          <p:cNvSpPr txBox="1">
+            <a:spLocks/>
+          </p:cNvSpPr>
+          <p:nvPr/>
+        </p:nvSpPr>
+        <p:spPr>
+          <a:xfrm>
+            <a:off x="0" y="409131"/>
+            <a:ext cx="12192000" cy="605853"/>
+          </a:xfrm>
+          <a:prstGeom prst="rect">
+            <a:avLst/>
+          </a:prstGeom>
+        </p:spPr>
+        <p:txBody>
+          <a:bodyPr vert="horz" lIns="91440" tIns="45720" rIns="91440" bIns="45720" rtlCol="0" anchor="ctr">
+            <a:noAutofit/>
+          </a:bodyPr>
+          <a:lstStyle>
+            <a:lvl1pPr algn="l" defTabSz="914400" rtl="0" eaLnBrk="1" latinLnBrk="0" hangingPunct="1">
+              <a:lnSpc>
+                <a:spcPct val="90000"/>
+              </a:lnSpc>
+              <a:spcBef>
+                <a:spcPct val="0"/>
+              </a:spcBef>
+              <a:buNone/>
+              <a:defRPr sz="4400" kern="1200">
+                <a:solidFill>
+                  <a:schemeClr val="tx1"/>
+                </a:solidFill>
+                <a:latin typeface="+mj-lt"/>
+                <a:ea typeface="+mj-ea"/>
+                <a:cs typeface="+mj-cs"/>
+              </a:defRPr>
+            </a:lvl1pPr>
+          </a:lstStyle>
+          <a:p>
+            <a:pPr algn="ctr" eaLnBrk="0" fontAlgn="base" hangingPunct="0">
+              <a:spcAft>
+                <a:spcPct val="0"/>
+              </a:spcAft>
+            </a:pPr>
+            <a:r>
+              <a:rPr lang="fr-CH" altLang="en-US" sz="3600" b="1" dirty="0" err="1" smtClean="0">
+                <a:solidFill>
+                  <a:srgbClr val="0099CC"/>
+                </a:solidFill>
+                <a:latin typeface="+mn-lt"/>
+              </a:rPr>
+              <a:t>Numerical</a:t>
+            </a:r>
+            <a:r>
+              <a:rPr lang="fr-CH" altLang="en-US" sz="3600" b="1" dirty="0" smtClean="0">
+                <a:solidFill>
+                  <a:srgbClr val="0099CC"/>
+                </a:solidFill>
+                <a:latin typeface="+mn-lt"/>
+              </a:rPr>
+              <a:t> </a:t>
+            </a:r>
+            <a:r>
+              <a:rPr lang="fr-CH" altLang="en-US" sz="3600" b="1" dirty="0" err="1" smtClean="0">
+                <a:solidFill>
+                  <a:srgbClr val="0099CC"/>
+                </a:solidFill>
+                <a:latin typeface="+mn-lt"/>
+              </a:rPr>
+              <a:t>analysis</a:t>
+            </a:r>
+            <a:endParaRPr lang="fr-CH" altLang="en-US" sz="3600" b="1" dirty="0" smtClean="0">
+              <a:solidFill>
+                <a:srgbClr val="0099CC"/>
+              </a:solidFill>
+              <a:latin typeface="+mn-lt"/>
+            </a:endParaRPr>
+          </a:p>
+        </p:txBody>
+      </p:sp>
+      <p:sp>
+        <p:nvSpPr>
+          <p:cNvPr id="8" name="Sous-titre 2"/>
+          <p:cNvSpPr txBox="1">
+            <a:spLocks/>
+          </p:cNvSpPr>
+          <p:nvPr/>
+        </p:nvSpPr>
+        <p:spPr>
+          <a:xfrm>
+            <a:off x="777240" y="1014983"/>
+            <a:ext cx="4288536" cy="4864608"/>
+          </a:xfrm>
+          <a:prstGeom prst="rect">
+            <a:avLst/>
+          </a:prstGeom>
+        </p:spPr>
+        <p:txBody>
+          <a:bodyPr vert="horz" lIns="91440" tIns="45720" rIns="91440" bIns="45720" rtlCol="0">
+            <a:noAutofit/>
+          </a:bodyPr>
+          <a:lstStyle>
+            <a:lvl1pPr marL="228600" indent="-228600" algn="l" defTabSz="914400" rtl="0" eaLnBrk="1" latinLnBrk="0" hangingPunct="1">
+              <a:lnSpc>
+                <a:spcPct val="90000"/>
+              </a:lnSpc>
+              <a:spcBef>
+                <a:spcPts val="1000"/>
+              </a:spcBef>
+              <a:buFont typeface="Arial" panose="020B0604020202020204" pitchFamily="34" charset="0"/>
+              <a:buChar char="•"/>
+              <a:defRPr sz="2800" kern="1200">
+                <a:solidFill>
+                  <a:schemeClr val="tx1"/>
+                </a:solidFill>
+                <a:latin typeface="+mn-lt"/>
+                <a:ea typeface="+mn-ea"/>
+                <a:cs typeface="+mn-cs"/>
+              </a:defRPr>
+            </a:lvl1pPr>
+            <a:lvl2pPr marL="685800" indent="-228600" algn="l" defTabSz="914400" rtl="0" eaLnBrk="1" latinLnBrk="0" hangingPunct="1">
+              <a:lnSpc>
+                <a:spcPct val="90000"/>
+              </a:lnSpc>
+              <a:spcBef>
+                <a:spcPts val="500"/>
+              </a:spcBef>
+              <a:buFont typeface="Arial" panose="020B0604020202020204" pitchFamily="34" charset="0"/>
+              <a:buChar char="•"/>
+              <a:defRPr sz="2400" kern="1200">
+                <a:solidFill>
+                  <a:schemeClr val="tx1"/>
+                </a:solidFill>
+                <a:latin typeface="+mn-lt"/>
+                <a:ea typeface="+mn-ea"/>
+                <a:cs typeface="+mn-cs"/>
+              </a:defRPr>
+            </a:lvl2pPr>
+            <a:lvl3pPr marL="1143000" indent="-228600" algn="l" defTabSz="914400" rtl="0" eaLnBrk="1" latinLnBrk="0" hangingPunct="1">
+              <a:lnSpc>
+                <a:spcPct val="90000"/>
+              </a:lnSpc>
+              <a:spcBef>
+                <a:spcPts val="500"/>
+              </a:spcBef>
+              <a:buFont typeface="Arial" panose="020B0604020202020204" pitchFamily="34" charset="0"/>
+              <a:buChar char="•"/>
+              <a:defRPr sz="2000" kern="1200">
+                <a:solidFill>
+                  <a:schemeClr val="tx1"/>
+                </a:solidFill>
+                <a:latin typeface="+mn-lt"/>
+                <a:ea typeface="+mn-ea"/>
+                <a:cs typeface="+mn-cs"/>
+              </a:defRPr>
+            </a:lvl3pPr>
+            <a:lvl4pPr marL="1600200" indent="-228600" algn="l" defTabSz="914400" rtl="0" eaLnBrk="1" latinLnBrk="0" hangingPunct="1">
+              <a:lnSpc>
+                <a:spcPct val="90000"/>
+              </a:lnSpc>
+              <a:spcBef>
+                <a:spcPts val="500"/>
+              </a:spcBef>
+              <a:buFont typeface="Arial" panose="020B0604020202020204" pitchFamily="34" charset="0"/>
+              <a:buChar char="•"/>
+              <a:defRPr sz="1800" kern="1200">
+                <a:solidFill>
+                  <a:schemeClr val="tx1"/>
+                </a:solidFill>
+                <a:latin typeface="+mn-lt"/>
+                <a:ea typeface="+mn-ea"/>
+                <a:cs typeface="+mn-cs"/>
+              </a:defRPr>
+            </a:lvl4pPr>
+            <a:lvl5pPr marL="2057400" indent="-228600" algn="l" defTabSz="914400" rtl="0" eaLnBrk="1" latinLnBrk="0" hangingPunct="1">
+              <a:lnSpc>
+                <a:spcPct val="90000"/>
+              </a:lnSpc>
+              <a:spcBef>
+                <a:spcPts val="500"/>
+              </a:spcBef>
+              <a:buFont typeface="Arial" panose="020B0604020202020204" pitchFamily="34" charset="0"/>
+              <a:buChar char="•"/>
+              <a:defRPr sz="1800" kern="1200">
+                <a:solidFill>
+                  <a:schemeClr val="tx1"/>
+                </a:solidFill>
+                <a:latin typeface="+mn-lt"/>
+                <a:ea typeface="+mn-ea"/>
+                <a:cs typeface="+mn-cs"/>
+              </a:defRPr>
+            </a:lvl5pPr>
+            <a:lvl6pPr marL="2514600" indent="-228600" algn="l" defTabSz="914400" rtl="0" eaLnBrk="1" latinLnBrk="0" hangingPunct="1">
+              <a:lnSpc>
+                <a:spcPct val="90000"/>
+              </a:lnSpc>
+              <a:spcBef>
+                <a:spcPts val="500"/>
+              </a:spcBef>
+              <a:buFont typeface="Arial" panose="020B0604020202020204" pitchFamily="34" charset="0"/>
+              <a:buChar char="•"/>
+              <a:defRPr sz="1800" kern="1200">
+                <a:solidFill>
+                  <a:schemeClr val="tx1"/>
+                </a:solidFill>
+                <a:latin typeface="+mn-lt"/>
+                <a:ea typeface="+mn-ea"/>
+                <a:cs typeface="+mn-cs"/>
+              </a:defRPr>
+            </a:lvl6pPr>
+            <a:lvl7pPr marL="2971800" indent="-228600" algn="l" defTabSz="914400" rtl="0" eaLnBrk="1" latinLnBrk="0" hangingPunct="1">
+              <a:lnSpc>
+                <a:spcPct val="90000"/>
+              </a:lnSpc>
+              <a:spcBef>
+                <a:spcPts val="500"/>
+              </a:spcBef>
+              <a:buFont typeface="Arial" panose="020B0604020202020204" pitchFamily="34" charset="0"/>
+              <a:buChar char="•"/>
+              <a:defRPr sz="1800" kern="1200">
+                <a:solidFill>
+                  <a:schemeClr val="tx1"/>
+                </a:solidFill>
+                <a:latin typeface="+mn-lt"/>
+                <a:ea typeface="+mn-ea"/>
+                <a:cs typeface="+mn-cs"/>
+              </a:defRPr>
+            </a:lvl7pPr>
+            <a:lvl8pPr marL="3429000" indent="-228600" algn="l" defTabSz="914400" rtl="0" eaLnBrk="1" latinLnBrk="0" hangingPunct="1">
+              <a:lnSpc>
+                <a:spcPct val="90000"/>
+              </a:lnSpc>
+              <a:spcBef>
+                <a:spcPts val="500"/>
+              </a:spcBef>
+              <a:buFont typeface="Arial" panose="020B0604020202020204" pitchFamily="34" charset="0"/>
+              <a:buChar char="•"/>
+              <a:defRPr sz="1800" kern="1200">
+                <a:solidFill>
+                  <a:schemeClr val="tx1"/>
+                </a:solidFill>
+                <a:latin typeface="+mn-lt"/>
+                <a:ea typeface="+mn-ea"/>
+                <a:cs typeface="+mn-cs"/>
+              </a:defRPr>
+            </a:lvl8pPr>
+            <a:lvl9pPr marL="3886200" indent="-228600" algn="l" defTabSz="914400" rtl="0" eaLnBrk="1" latinLnBrk="0" hangingPunct="1">
+              <a:lnSpc>
+                <a:spcPct val="90000"/>
+              </a:lnSpc>
+              <a:spcBef>
+                <a:spcPts val="500"/>
+              </a:spcBef>
+              <a:buFont typeface="Arial" panose="020B0604020202020204" pitchFamily="34" charset="0"/>
+              <a:buChar char="•"/>
+              <a:defRPr sz="1800" kern="1200">
+                <a:solidFill>
+                  <a:schemeClr val="tx1"/>
+                </a:solidFill>
+                <a:latin typeface="+mn-lt"/>
+                <a:ea typeface="+mn-ea"/>
+                <a:cs typeface="+mn-cs"/>
+              </a:defRPr>
+            </a:lvl9pPr>
+          </a:lstStyle>
+          <a:p>
+            <a:pPr marL="342900" indent="-342900" eaLnBrk="0" fontAlgn="base" hangingPunct="0">
+              <a:lnSpc>
+                <a:spcPct val="150000"/>
+              </a:lnSpc>
+              <a:spcBef>
+                <a:spcPct val="20000"/>
+              </a:spcBef>
+              <a:spcAft>
+                <a:spcPct val="0"/>
+              </a:spcAft>
+              <a:buClr>
+                <a:schemeClr val="accent1"/>
+              </a:buClr>
+              <a:buBlip>
+                <a:blip r:embed="rId3"/>
+              </a:buBlip>
+            </a:pPr>
+            <a:r>
+              <a:rPr lang="en-US" sz="2200" dirty="0" smtClean="0">
+                <a:solidFill>
+                  <a:srgbClr val="5F5F5F"/>
+                </a:solidFill>
+              </a:rPr>
+              <a:t>Clearly, NIO is way better than classical IO of java. Average waiting time at load 100 clients using IO server is quite the same as for 400 client using NIO server.</a:t>
+            </a:r>
+          </a:p>
+          <a:p>
+            <a:pPr marL="342900" indent="-342900" eaLnBrk="0" fontAlgn="base" hangingPunct="0">
+              <a:lnSpc>
+                <a:spcPct val="150000"/>
+              </a:lnSpc>
+              <a:spcBef>
+                <a:spcPct val="20000"/>
+              </a:spcBef>
+              <a:spcAft>
+                <a:spcPct val="0"/>
+              </a:spcAft>
+              <a:buClr>
+                <a:schemeClr val="accent1"/>
+              </a:buClr>
+              <a:buBlip>
+                <a:blip r:embed="rId3"/>
+              </a:buBlip>
+            </a:pPr>
+            <a:r>
+              <a:rPr lang="en-US" sz="2200" dirty="0" smtClean="0">
+                <a:solidFill>
+                  <a:srgbClr val="5F5F5F"/>
+                </a:solidFill>
+              </a:rPr>
+              <a:t>As first analysis, the growth of the waiting time seems linear in both cases (IO / NIO).</a:t>
+            </a:r>
+          </a:p>
+        </p:txBody>
+      </p:sp>
+    </p:spTree>
+    <p:extLst>
+      <p:ext uri="{BB962C8B-B14F-4D97-AF65-F5344CB8AC3E}">
+        <p14:creationId xmlns:p14="http://schemas.microsoft.com/office/powerpoint/2010/main" val="3146485266"/>
+      </p:ext>
+    </p:extLst>
+  </p:cSld>
+  <p:clrMapOvr>
+    <a:masterClrMapping/>
+  </p:clrMapOvr>
+  <p:timing>
+    <p:tnLst>
+      <p:par>
+        <p:cTn id="1" dur="indefinite" restart="never" nodeType="tmRoot"/>
+      </p:par>
+    </p:tnLst>
+  </p:timing>
 </p:sld>
 </file>
 
@@ -3490,4 +6641,265 @@
     </a:ext>
   </a:extLst>
 </a:theme>
+</file>
+
+<file path=ppt/theme/theme2.xml><?xml version="1.0" encoding="utf-8"?>
+<a:theme xmlns:a="http://schemas.openxmlformats.org/drawingml/2006/main" name="Thème Office">
+  <a:themeElements>
+    <a:clrScheme name="Office">
+      <a:dk1>
+        <a:sysClr val="windowText" lastClr="000000"/>
+      </a:dk1>
+      <a:lt1>
+        <a:sysClr val="window" lastClr="FFFFFF"/>
+      </a:lt1>
+      <a:dk2>
+        <a:srgbClr val="44546A"/>
+      </a:dk2>
+      <a:lt2>
+        <a:srgbClr val="E7E6E6"/>
+      </a:lt2>
+      <a:accent1>
+        <a:srgbClr val="5B9BD5"/>
+      </a:accent1>
+      <a:accent2>
+        <a:srgbClr val="ED7D31"/>
+      </a:accent2>
+      <a:accent3>
+        <a:srgbClr val="A5A5A5"/>
+      </a:accent3>
+      <a:accent4>
+        <a:srgbClr val="FFC000"/>
+      </a:accent4>
+      <a:accent5>
+        <a:srgbClr val="4472C4"/>
+      </a:accent5>
+      <a:accent6>
+        <a:srgbClr val="70AD47"/>
+      </a:accent6>
+      <a:hlink>
+        <a:srgbClr val="0563C1"/>
+      </a:hlink>
+      <a:folHlink>
+        <a:srgbClr val="954F72"/>
+      </a:folHlink>
+    </a:clrScheme>
+    <a:fontScheme name="Office">
+      <a:majorFont>
+        <a:latin typeface="Calibri Light" panose="020F0302020204030204"/>
+        <a:ea typeface=""/>
+        <a:cs typeface=""/>
+        <a:font script="Jpan" typeface="ＭＳ Ｐゴシック"/>
+        <a:font script="Hang" typeface="맑은 고딕"/>
+        <a:font script="Hans" typeface="宋体"/>
+        <a:font script="Hant" typeface="新細明體"/>
+        <a:font script="Arab" typeface="Times New Roman"/>
+        <a:font script="Hebr" typeface="Times New Roman"/>
+        <a:font script="Thai" typeface="Angsana New"/>
+        <a:font script="Ethi" typeface="Nyala"/>
+        <a:font script="Beng" typeface="Vrinda"/>
+        <a:font script="Gujr" typeface="Shruti"/>
+        <a:font script="Khmr" typeface="MoolBoran"/>
+        <a:font script="Knda" typeface="Tunga"/>
+        <a:font script="Guru" typeface="Raavi"/>
+        <a:font script="Cans" typeface="Euphemia"/>
+        <a:font script="Cher" typeface="Plantagenet Cherokee"/>
+        <a:font script="Yiii" typeface="Microsoft Yi Baiti"/>
+        <a:font script="Tibt" typeface="Microsoft Himalaya"/>
+        <a:font script="Thaa" typeface="MV Boli"/>
+        <a:font script="Deva" typeface="Mangal"/>
+        <a:font script="Telu" typeface="Gautami"/>
+        <a:font script="Taml" typeface="Latha"/>
+        <a:font script="Syrc" typeface="Estrangelo Edessa"/>
+        <a:font script="Orya" typeface="Kalinga"/>
+        <a:font script="Mlym" typeface="Kartika"/>
+        <a:font script="Laoo" typeface="DokChampa"/>
+        <a:font script="Sinh" typeface="Iskoola Pota"/>
+        <a:font script="Mong" typeface="Mongolian Baiti"/>
+        <a:font script="Viet" typeface="Times New Roman"/>
+        <a:font script="Uigh" typeface="Microsoft Uighur"/>
+        <a:font script="Geor" typeface="Sylfaen"/>
+      </a:majorFont>
+      <a:minorFont>
+        <a:latin typeface="Calibri" panose="020F0502020204030204"/>
+        <a:ea typeface=""/>
+        <a:cs typeface=""/>
+        <a:font script="Jpan" typeface="ＭＳ Ｐゴシック"/>
+        <a:font script="Hang" typeface="맑은 고딕"/>
+        <a:font script="Hans" typeface="宋体"/>
+        <a:font script="Hant" typeface="新細明體"/>
+        <a:font script="Arab" typeface="Arial"/>
+        <a:font script="Hebr" typeface="Arial"/>
+        <a:font script="Thai" typeface="Cordia New"/>
+        <a:font script="Ethi" typeface="Nyala"/>
+        <a:font script="Beng" typeface="Vrinda"/>
+        <a:font script="Gujr" typeface="Shruti"/>
+        <a:font script="Khmr" typeface="DaunPenh"/>
+        <a:font script="Knda" typeface="Tunga"/>
+        <a:font script="Guru" typeface="Raavi"/>
+        <a:font script="Cans" typeface="Euphemia"/>
+        <a:font script="Cher" typeface="Plantagenet Cherokee"/>
+        <a:font script="Yiii" typeface="Microsoft Yi Baiti"/>
+        <a:font script="Tibt" typeface="Microsoft Himalaya"/>
+        <a:font script="Thaa" typeface="MV Boli"/>
+        <a:font script="Deva" typeface="Mangal"/>
+        <a:font script="Telu" typeface="Gautami"/>
+        <a:font script="Taml" typeface="Latha"/>
+        <a:font script="Syrc" typeface="Estrangelo Edessa"/>
+        <a:font script="Orya" typeface="Kalinga"/>
+        <a:font script="Mlym" typeface="Kartika"/>
+        <a:font script="Laoo" typeface="DokChampa"/>
+        <a:font script="Sinh" typeface="Iskoola Pota"/>
+        <a:font script="Mong" typeface="Mongolian Baiti"/>
+        <a:font script="Viet" typeface="Arial"/>
+        <a:font script="Uigh" typeface="Microsoft Uighur"/>
+        <a:font script="Geor" typeface="Sylfaen"/>
+      </a:minorFont>
+    </a:fontScheme>
+    <a:fmtScheme name="Office">
+      <a:fillStyleLst>
+        <a:solidFill>
+          <a:schemeClr val="phClr"/>
+        </a:solidFill>
+        <a:gradFill rotWithShape="1">
+          <a:gsLst>
+            <a:gs pos="0">
+              <a:schemeClr val="phClr">
+                <a:lumMod val="110000"/>
+                <a:satMod val="105000"/>
+                <a:tint val="67000"/>
+              </a:schemeClr>
+            </a:gs>
+            <a:gs pos="50000">
+              <a:schemeClr val="phClr">
+                <a:lumMod val="105000"/>
+                <a:satMod val="103000"/>
+                <a:tint val="73000"/>
+              </a:schemeClr>
+            </a:gs>
+            <a:gs pos="100000">
+              <a:schemeClr val="phClr">
+                <a:lumMod val="105000"/>
+                <a:satMod val="109000"/>
+                <a:tint val="81000"/>
+              </a:schemeClr>
+            </a:gs>
+          </a:gsLst>
+          <a:lin ang="5400000" scaled="0"/>
+        </a:gradFill>
+        <a:gradFill rotWithShape="1">
+          <a:gsLst>
+            <a:gs pos="0">
+              <a:schemeClr val="phClr">
+                <a:satMod val="103000"/>
+                <a:lumMod val="102000"/>
+                <a:tint val="94000"/>
+              </a:schemeClr>
+            </a:gs>
+            <a:gs pos="50000">
+              <a:schemeClr val="phClr">
+                <a:satMod val="110000"/>
+                <a:lumMod val="100000"/>
+                <a:shade val="100000"/>
+              </a:schemeClr>
+            </a:gs>
+            <a:gs pos="100000">
+              <a:schemeClr val="phClr">
+                <a:lumMod val="99000"/>
+                <a:satMod val="120000"/>
+                <a:shade val="78000"/>
+              </a:schemeClr>
+            </a:gs>
+          </a:gsLst>
+          <a:lin ang="5400000" scaled="0"/>
+        </a:gradFill>
+      </a:fillStyleLst>
+      <a:lnStyleLst>
+        <a:ln w="6350" cap="flat" cmpd="sng" algn="ctr">
+          <a:solidFill>
+            <a:schemeClr val="phClr"/>
+          </a:solidFill>
+          <a:prstDash val="solid"/>
+          <a:miter lim="800000"/>
+        </a:ln>
+        <a:ln w="12700" cap="flat" cmpd="sng" algn="ctr">
+          <a:solidFill>
+            <a:schemeClr val="phClr"/>
+          </a:solidFill>
+          <a:prstDash val="solid"/>
+          <a:miter lim="800000"/>
+        </a:ln>
+        <a:ln w="19050" cap="flat" cmpd="sng" algn="ctr">
+          <a:solidFill>
+            <a:schemeClr val="phClr"/>
+          </a:solidFill>
+          <a:prstDash val="solid"/>
+          <a:miter lim="800000"/>
+        </a:ln>
+      </a:lnStyleLst>
+      <a:effectStyleLst>
+        <a:effectStyle>
+          <a:effectLst/>
+        </a:effectStyle>
+        <a:effectStyle>
+          <a:effectLst/>
+        </a:effectStyle>
+        <a:effectStyle>
+          <a:effectLst>
+            <a:outerShdw blurRad="57150" dist="19050" dir="5400000" algn="ctr" rotWithShape="0">
+              <a:srgbClr val="000000">
+                <a:alpha val="63000"/>
+              </a:srgbClr>
+            </a:outerShdw>
+          </a:effectLst>
+        </a:effectStyle>
+      </a:effectStyleLst>
+      <a:bgFillStyleLst>
+        <a:solidFill>
+          <a:schemeClr val="phClr"/>
+        </a:solidFill>
+        <a:solidFill>
+          <a:schemeClr val="phClr">
+            <a:tint val="95000"/>
+            <a:satMod val="170000"/>
+          </a:schemeClr>
+        </a:solidFill>
+        <a:gradFill rotWithShape="1">
+          <a:gsLst>
+            <a:gs pos="0">
+              <a:schemeClr val="phClr">
+                <a:tint val="93000"/>
+                <a:satMod val="150000"/>
+                <a:shade val="98000"/>
+                <a:lumMod val="102000"/>
+              </a:schemeClr>
+            </a:gs>
+            <a:gs pos="50000">
+              <a:schemeClr val="phClr">
+                <a:tint val="98000"/>
+                <a:satMod val="130000"/>
+                <a:shade val="90000"/>
+                <a:lumMod val="103000"/>
+              </a:schemeClr>
+            </a:gs>
+            <a:gs pos="100000">
+              <a:schemeClr val="phClr">
+                <a:shade val="63000"/>
+                <a:satMod val="120000"/>
+              </a:schemeClr>
+            </a:gs>
+          </a:gsLst>
+          <a:lin ang="5400000" scaled="0"/>
+        </a:gradFill>
+      </a:bgFillStyleLst>
+    </a:fmtScheme>
+  </a:themeElements>
+  <a:objectDefaults/>
+  <a:extraClrSchemeLst/>
+  <a:extLst>
+    <a:ext uri="{05A4C25C-085E-4340-85A3-A5531E510DB2}">
+      <thm15:themeFamily xmlns:thm15="http://schemas.microsoft.com/office/thememl/2012/main" name="Office Theme" id="{62F939B6-93AF-4DB8-9C6B-D6C7DFDC589F}" vid="{4A3C46E8-61CC-4603-A589-7422A47A8E4A}"/>
+    </a:ext>
+  </a:extLst>
+</a:theme>
 </file>
</xml_diff>

<commit_message>
Improve outline of presentation
</commit_message>
<xml_diff>
--- a/Perf Eval - Premiere presentation.pptx
+++ b/Perf Eval - Premiere presentation.pptx
@@ -3669,7 +3669,7 @@
         <p:spPr>
           <a:xfrm>
             <a:off x="786384" y="2065846"/>
-            <a:ext cx="10661904" cy="2881058"/>
+            <a:ext cx="10661904" cy="3557714"/>
           </a:xfrm>
           <a:prstGeom prst="rect">
             <a:avLst/>
@@ -3950,6 +3950,65 @@
               </a:rPr>
               <a:t>Method</a:t>
             </a:r>
+          </a:p>
+          <a:p>
+            <a:pPr marL="342900" indent="-342900" eaLnBrk="0" fontAlgn="base" hangingPunct="0">
+              <a:lnSpc>
+                <a:spcPct val="150000"/>
+              </a:lnSpc>
+              <a:spcBef>
+                <a:spcPct val="20000"/>
+              </a:spcBef>
+              <a:spcAft>
+                <a:spcPct val="0"/>
+              </a:spcAft>
+              <a:buClr>
+                <a:schemeClr val="accent1"/>
+              </a:buClr>
+              <a:buBlip>
+                <a:blip r:embed="rId2"/>
+              </a:buBlip>
+            </a:pPr>
+            <a:r>
+              <a:rPr lang="en-US" sz="2200" dirty="0" smtClean="0">
+                <a:solidFill>
+                  <a:srgbClr val="5F5F5F"/>
+                </a:solidFill>
+              </a:rPr>
+              <a:t>Experiments</a:t>
+            </a:r>
+          </a:p>
+          <a:p>
+            <a:pPr marL="342900" indent="-342900" eaLnBrk="0" fontAlgn="base" hangingPunct="0">
+              <a:lnSpc>
+                <a:spcPct val="150000"/>
+              </a:lnSpc>
+              <a:spcBef>
+                <a:spcPct val="20000"/>
+              </a:spcBef>
+              <a:spcAft>
+                <a:spcPct val="0"/>
+              </a:spcAft>
+              <a:buClr>
+                <a:schemeClr val="accent1"/>
+              </a:buClr>
+              <a:buBlip>
+                <a:blip r:embed="rId2"/>
+              </a:buBlip>
+            </a:pPr>
+            <a:r>
+              <a:rPr lang="en-US" sz="2200" dirty="0" smtClean="0">
+                <a:solidFill>
+                  <a:srgbClr val="5F5F5F"/>
+                </a:solidFill>
+              </a:rPr>
+              <a:t>Numerical Analysis</a:t>
+            </a:r>
+            <a:endParaRPr lang="en-US" sz="2200" dirty="0" smtClean="0">
+              <a:solidFill>
+                <a:srgbClr val="5F5F5F"/>
+              </a:solidFill>
+            </a:endParaRPr>
           </a:p>
           <a:p>
             <a:pPr lvl="1">

</xml_diff>